<commit_message>
Initial working version of MAX61856 with SPI.
</commit_message>
<xml_diff>
--- a/TechnicalDataPackage/Components/MAX31856/MAX31856Notes.pptx
+++ b/TechnicalDataPackage/Components/MAX31856/MAX31856Notes.pptx
@@ -5,13 +5,14 @@
     <p:sldMasterId id="2147483648" r:id="rId1"/>
   </p:sldMasterIdLst>
   <p:notesMasterIdLst>
-    <p:notesMasterId r:id="rId6"/>
+    <p:notesMasterId r:id="rId7"/>
   </p:notesMasterIdLst>
   <p:sldIdLst>
     <p:sldId id="256" r:id="rId2"/>
     <p:sldId id="259" r:id="rId3"/>
     <p:sldId id="258" r:id="rId4"/>
-    <p:sldId id="257" r:id="rId5"/>
+    <p:sldId id="260" r:id="rId5"/>
+    <p:sldId id="257" r:id="rId6"/>
   </p:sldIdLst>
   <p:sldSz cx="12192000" cy="6858000"/>
   <p:notesSz cx="6858000" cy="9144000"/>
@@ -9372,6 +9373,9 @@
                 <a:solidFill>
                   <a:srgbClr val="808080"/>
                 </a:solidFill>
+                <a:highlight>
+                  <a:srgbClr val="00FF00"/>
+                </a:highlight>
                 <a:latin typeface="Cascadia Mono" panose="020B0609020000020004" pitchFamily="49" charset="0"/>
               </a:rPr>
               <a:t>#define</a:t>
@@ -9381,6 +9385,9 @@
                 <a:solidFill>
                   <a:srgbClr val="000000"/>
                 </a:solidFill>
+                <a:highlight>
+                  <a:srgbClr val="00FF00"/>
+                </a:highlight>
                 <a:latin typeface="Cascadia Mono" panose="020B0609020000020004" pitchFamily="49" charset="0"/>
               </a:rPr>
               <a:t> </a:t>
@@ -9390,6 +9397,9 @@
                 <a:solidFill>
                   <a:srgbClr val="6F008A"/>
                 </a:solidFill>
+                <a:highlight>
+                  <a:srgbClr val="00FF00"/>
+                </a:highlight>
                 <a:latin typeface="Cascadia Mono" panose="020B0609020000020004" pitchFamily="49" charset="0"/>
               </a:rPr>
               <a:t>MAX31856_CR0_1SHOT</a:t>
@@ -9399,6 +9409,9 @@
                 <a:solidFill>
                   <a:srgbClr val="000000"/>
                 </a:solidFill>
+                <a:highlight>
+                  <a:srgbClr val="00FF00"/>
+                </a:highlight>
                 <a:latin typeface="Cascadia Mono" panose="020B0609020000020004" pitchFamily="49" charset="0"/>
               </a:rPr>
               <a:t> 0x40       </a:t>
@@ -9408,6 +9421,9 @@
                 <a:solidFill>
                   <a:srgbClr val="006400"/>
                 </a:solidFill>
+                <a:highlight>
+                  <a:srgbClr val="00FF00"/>
+                </a:highlight>
                 <a:latin typeface="Cascadia Mono" panose="020B0609020000020004" pitchFamily="49" charset="0"/>
               </a:rPr>
               <a:t>///&lt; Config 0 one shot convert flag</a:t>
@@ -9416,6 +9432,9 @@
               <a:solidFill>
                 <a:srgbClr val="000000"/>
               </a:solidFill>
+              <a:highlight>
+                <a:srgbClr val="00FF00"/>
+              </a:highlight>
               <a:latin typeface="Cascadia Mono" panose="020B0609020000020004" pitchFamily="49" charset="0"/>
             </a:endParaRPr>
           </a:p>
@@ -10512,6 +10531,9 @@
                 <a:solidFill>
                   <a:srgbClr val="808080"/>
                 </a:solidFill>
+                <a:highlight>
+                  <a:srgbClr val="FFFF00"/>
+                </a:highlight>
                 <a:latin typeface="Cascadia Mono" panose="020B0609020000020004" pitchFamily="49" charset="0"/>
               </a:rPr>
               <a:t>#define</a:t>
@@ -10521,6 +10543,9 @@
                 <a:solidFill>
                   <a:srgbClr val="000000"/>
                 </a:solidFill>
+                <a:highlight>
+                  <a:srgbClr val="FFFF00"/>
+                </a:highlight>
                 <a:latin typeface="Cascadia Mono" panose="020B0609020000020004" pitchFamily="49" charset="0"/>
               </a:rPr>
               <a:t> </a:t>
@@ -10530,6 +10555,9 @@
                 <a:solidFill>
                   <a:srgbClr val="6F008A"/>
                 </a:solidFill>
+                <a:highlight>
+                  <a:srgbClr val="FFFF00"/>
+                </a:highlight>
                 <a:latin typeface="Cascadia Mono" panose="020B0609020000020004" pitchFamily="49" charset="0"/>
               </a:rPr>
               <a:t>MAX31856_SR_REG</a:t>
@@ -10539,6 +10567,9 @@
                 <a:solidFill>
                   <a:srgbClr val="000000"/>
                 </a:solidFill>
+                <a:highlight>
+                  <a:srgbClr val="FFFF00"/>
+                </a:highlight>
                 <a:latin typeface="Cascadia Mono" panose="020B0609020000020004" pitchFamily="49" charset="0"/>
               </a:rPr>
               <a:t> 0x0F    </a:t>
@@ -10548,10 +10579,24 @@
                 <a:solidFill>
                   <a:srgbClr val="006400"/>
                 </a:solidFill>
+                <a:highlight>
+                  <a:srgbClr val="FFFF00"/>
+                </a:highlight>
                 <a:latin typeface="Cascadia Mono" panose="020B0609020000020004" pitchFamily="49" charset="0"/>
               </a:rPr>
               <a:t>///&lt; Fault Status Register</a:t>
             </a:r>
+            <a:endParaRPr lang="en-US" sz="1000" dirty="0">
+              <a:solidFill>
+                <a:srgbClr val="000000"/>
+              </a:solidFill>
+              <a:highlight>
+                <a:srgbClr val="FFFF00"/>
+              </a:highlight>
+              <a:latin typeface="Cascadia Mono" panose="020B0609020000020004" pitchFamily="49" charset="0"/>
+            </a:endParaRPr>
+          </a:p>
+          <a:p>
             <a:endParaRPr lang="en-US" sz="1000" dirty="0">
               <a:solidFill>
                 <a:srgbClr val="000000"/>
@@ -10560,6 +10605,51 @@
             </a:endParaRPr>
           </a:p>
           <a:p>
+            <a:r>
+              <a:rPr lang="en-US" sz="1000" dirty="0">
+                <a:solidFill>
+                  <a:srgbClr val="808080"/>
+                </a:solidFill>
+                <a:latin typeface="Cascadia Mono" panose="020B0609020000020004" pitchFamily="49" charset="0"/>
+              </a:rPr>
+              <a:t>#define</a:t>
+            </a:r>
+            <a:r>
+              <a:rPr lang="en-US" sz="1000" dirty="0">
+                <a:solidFill>
+                  <a:srgbClr val="000000"/>
+                </a:solidFill>
+                <a:latin typeface="Cascadia Mono" panose="020B0609020000020004" pitchFamily="49" charset="0"/>
+              </a:rPr>
+              <a:t> </a:t>
+            </a:r>
+            <a:r>
+              <a:rPr lang="en-US" sz="1000" dirty="0">
+                <a:solidFill>
+                  <a:srgbClr val="6F008A"/>
+                </a:solidFill>
+                <a:latin typeface="Cascadia Mono" panose="020B0609020000020004" pitchFamily="49" charset="0"/>
+              </a:rPr>
+              <a:t>MAX31856_FAULT_CJRANGE</a:t>
+            </a:r>
+            <a:r>
+              <a:rPr lang="en-US" sz="1000" dirty="0">
+                <a:solidFill>
+                  <a:srgbClr val="000000"/>
+                </a:solidFill>
+                <a:latin typeface="Cascadia Mono" panose="020B0609020000020004" pitchFamily="49" charset="0"/>
+              </a:rPr>
+              <a:t> 0x80 </a:t>
+            </a:r>
+            <a:r>
+              <a:rPr lang="en-US" sz="1000" dirty="0">
+                <a:solidFill>
+                  <a:srgbClr val="006400"/>
+                </a:solidFill>
+                <a:latin typeface="Cascadia Mono" panose="020B0609020000020004" pitchFamily="49" charset="0"/>
+              </a:rPr>
+              <a:t>///&lt; Fault status Cold Junction Out-of-Range flag</a:t>
+            </a:r>
             <a:endParaRPr lang="en-US" sz="1000" dirty="0">
               <a:solidFill>
                 <a:srgbClr val="000000"/>
@@ -10593,16 +10683,16 @@
                 </a:solidFill>
                 <a:latin typeface="Cascadia Mono" panose="020B0609020000020004" pitchFamily="49" charset="0"/>
               </a:rPr>
-              <a:t>MAX31856_FAULT_CJRANGE</a:t>
-            </a:r>
-            <a:r>
-              <a:rPr lang="en-US" sz="1000" dirty="0">
-                <a:solidFill>
-                  <a:srgbClr val="000000"/>
-                </a:solidFill>
-                <a:latin typeface="Cascadia Mono" panose="020B0609020000020004" pitchFamily="49" charset="0"/>
-              </a:rPr>
-              <a:t> 0x80 </a:t>
+              <a:t>MAX31856_FAULT_TCRANGE</a:t>
+            </a:r>
+            <a:r>
+              <a:rPr lang="en-US" sz="1000" dirty="0">
+                <a:solidFill>
+                  <a:srgbClr val="000000"/>
+                </a:solidFill>
+                <a:latin typeface="Cascadia Mono" panose="020B0609020000020004" pitchFamily="49" charset="0"/>
+              </a:rPr>
+              <a:t> 0x40 </a:t>
             </a:r>
             <a:r>
               <a:rPr lang="en-US" sz="1000" dirty="0">
@@ -10611,7 +10701,7 @@
                 </a:solidFill>
                 <a:latin typeface="Cascadia Mono" panose="020B0609020000020004" pitchFamily="49" charset="0"/>
               </a:rPr>
-              <a:t>///&lt; Fault status Cold Junction Out-of-Range flag</a:t>
+              <a:t>///&lt; Fault status Thermocouple Out-of-Range flag</a:t>
             </a:r>
             <a:endParaRPr lang="en-US" sz="1000" dirty="0">
               <a:solidFill>
@@ -10646,16 +10736,16 @@
                 </a:solidFill>
                 <a:latin typeface="Cascadia Mono" panose="020B0609020000020004" pitchFamily="49" charset="0"/>
               </a:rPr>
-              <a:t>MAX31856_FAULT_TCRANGE</a:t>
-            </a:r>
-            <a:r>
-              <a:rPr lang="en-US" sz="1000" dirty="0">
-                <a:solidFill>
-                  <a:srgbClr val="000000"/>
-                </a:solidFill>
-                <a:latin typeface="Cascadia Mono" panose="020B0609020000020004" pitchFamily="49" charset="0"/>
-              </a:rPr>
-              <a:t> 0x40 </a:t>
+              <a:t>MAX31856_FAULT_CJHIGH</a:t>
+            </a:r>
+            <a:r>
+              <a:rPr lang="en-US" sz="1000" dirty="0">
+                <a:solidFill>
+                  <a:srgbClr val="000000"/>
+                </a:solidFill>
+                <a:latin typeface="Cascadia Mono" panose="020B0609020000020004" pitchFamily="49" charset="0"/>
+              </a:rPr>
+              <a:t> 0x20 </a:t>
             </a:r>
             <a:r>
               <a:rPr lang="en-US" sz="1000" dirty="0">
@@ -10664,7 +10754,7 @@
                 </a:solidFill>
                 <a:latin typeface="Cascadia Mono" panose="020B0609020000020004" pitchFamily="49" charset="0"/>
               </a:rPr>
-              <a:t>///&lt; Fault status Thermocouple Out-of-Range flag</a:t>
+              <a:t>///&lt; Fault status Cold-Junction High Fault flag</a:t>
             </a:r>
             <a:endParaRPr lang="en-US" sz="1000" dirty="0">
               <a:solidFill>
@@ -10699,16 +10789,16 @@
                 </a:solidFill>
                 <a:latin typeface="Cascadia Mono" panose="020B0609020000020004" pitchFamily="49" charset="0"/>
               </a:rPr>
-              <a:t>MAX31856_FAULT_CJHIGH</a:t>
-            </a:r>
-            <a:r>
-              <a:rPr lang="en-US" sz="1000" dirty="0">
-                <a:solidFill>
-                  <a:srgbClr val="000000"/>
-                </a:solidFill>
-                <a:latin typeface="Cascadia Mono" panose="020B0609020000020004" pitchFamily="49" charset="0"/>
-              </a:rPr>
-              <a:t> 0x20 </a:t>
+              <a:t>MAX31856_FAULT_CJLOW</a:t>
+            </a:r>
+            <a:r>
+              <a:rPr lang="en-US" sz="1000" dirty="0">
+                <a:solidFill>
+                  <a:srgbClr val="000000"/>
+                </a:solidFill>
+                <a:latin typeface="Cascadia Mono" panose="020B0609020000020004" pitchFamily="49" charset="0"/>
+              </a:rPr>
+              <a:t> 0x10 </a:t>
             </a:r>
             <a:r>
               <a:rPr lang="en-US" sz="1000" dirty="0">
@@ -10717,7 +10807,7 @@
                 </a:solidFill>
                 <a:latin typeface="Cascadia Mono" panose="020B0609020000020004" pitchFamily="49" charset="0"/>
               </a:rPr>
-              <a:t>///&lt; Fault status Cold-Junction High Fault flag</a:t>
+              <a:t>///&lt; Fault status Cold-Junction Low Fault flag</a:t>
             </a:r>
             <a:endParaRPr lang="en-US" sz="1000" dirty="0">
               <a:solidFill>
@@ -10752,16 +10842,16 @@
                 </a:solidFill>
                 <a:latin typeface="Cascadia Mono" panose="020B0609020000020004" pitchFamily="49" charset="0"/>
               </a:rPr>
-              <a:t>MAX31856_FAULT_CJLOW</a:t>
-            </a:r>
-            <a:r>
-              <a:rPr lang="en-US" sz="1000" dirty="0">
-                <a:solidFill>
-                  <a:srgbClr val="000000"/>
-                </a:solidFill>
-                <a:latin typeface="Cascadia Mono" panose="020B0609020000020004" pitchFamily="49" charset="0"/>
-              </a:rPr>
-              <a:t> 0x10 </a:t>
+              <a:t>MAX31856_FAULT_TCHIGH</a:t>
+            </a:r>
+            <a:r>
+              <a:rPr lang="en-US" sz="1000" dirty="0">
+                <a:solidFill>
+                  <a:srgbClr val="000000"/>
+                </a:solidFill>
+                <a:latin typeface="Cascadia Mono" panose="020B0609020000020004" pitchFamily="49" charset="0"/>
+              </a:rPr>
+              <a:t> 0x08 </a:t>
             </a:r>
             <a:r>
               <a:rPr lang="en-US" sz="1000" dirty="0">
@@ -10770,7 +10860,7 @@
                 </a:solidFill>
                 <a:latin typeface="Cascadia Mono" panose="020B0609020000020004" pitchFamily="49" charset="0"/>
               </a:rPr>
-              <a:t>///&lt; Fault status Cold-Junction Low Fault flag</a:t>
+              <a:t>///&lt; Fault status Thermocouple Temperature High Fault flag</a:t>
             </a:r>
             <a:endParaRPr lang="en-US" sz="1000" dirty="0">
               <a:solidFill>
@@ -10805,16 +10895,16 @@
                 </a:solidFill>
                 <a:latin typeface="Cascadia Mono" panose="020B0609020000020004" pitchFamily="49" charset="0"/>
               </a:rPr>
-              <a:t>MAX31856_FAULT_TCHIGH</a:t>
-            </a:r>
-            <a:r>
-              <a:rPr lang="en-US" sz="1000" dirty="0">
-                <a:solidFill>
-                  <a:srgbClr val="000000"/>
-                </a:solidFill>
-                <a:latin typeface="Cascadia Mono" panose="020B0609020000020004" pitchFamily="49" charset="0"/>
-              </a:rPr>
-              <a:t> 0x08 </a:t>
+              <a:t>MAX31856_FAULT_TCLOW</a:t>
+            </a:r>
+            <a:r>
+              <a:rPr lang="en-US" sz="1000" dirty="0">
+                <a:solidFill>
+                  <a:srgbClr val="000000"/>
+                </a:solidFill>
+                <a:latin typeface="Cascadia Mono" panose="020B0609020000020004" pitchFamily="49" charset="0"/>
+              </a:rPr>
+              <a:t> 0x04 </a:t>
             </a:r>
             <a:r>
               <a:rPr lang="en-US" sz="1000" dirty="0">
@@ -10823,7 +10913,7 @@
                 </a:solidFill>
                 <a:latin typeface="Cascadia Mono" panose="020B0609020000020004" pitchFamily="49" charset="0"/>
               </a:rPr>
-              <a:t>///&lt; Fault status Thermocouple Temperature High Fault flag</a:t>
+              <a:t>///&lt; Fault status Thermocouple Temperature Low Fault flag</a:t>
             </a:r>
             <a:endParaRPr lang="en-US" sz="1000" dirty="0">
               <a:solidFill>
@@ -10858,59 +10948,6 @@
                 </a:solidFill>
                 <a:latin typeface="Cascadia Mono" panose="020B0609020000020004" pitchFamily="49" charset="0"/>
               </a:rPr>
-              <a:t>MAX31856_FAULT_TCLOW</a:t>
-            </a:r>
-            <a:r>
-              <a:rPr lang="en-US" sz="1000" dirty="0">
-                <a:solidFill>
-                  <a:srgbClr val="000000"/>
-                </a:solidFill>
-                <a:latin typeface="Cascadia Mono" panose="020B0609020000020004" pitchFamily="49" charset="0"/>
-              </a:rPr>
-              <a:t> 0x04 </a:t>
-            </a:r>
-            <a:r>
-              <a:rPr lang="en-US" sz="1000" dirty="0">
-                <a:solidFill>
-                  <a:srgbClr val="006400"/>
-                </a:solidFill>
-                <a:latin typeface="Cascadia Mono" panose="020B0609020000020004" pitchFamily="49" charset="0"/>
-              </a:rPr>
-              <a:t>///&lt; Fault status Thermocouple Temperature Low Fault flag</a:t>
-            </a:r>
-            <a:endParaRPr lang="en-US" sz="1000" dirty="0">
-              <a:solidFill>
-                <a:srgbClr val="000000"/>
-              </a:solidFill>
-              <a:latin typeface="Cascadia Mono" panose="020B0609020000020004" pitchFamily="49" charset="0"/>
-            </a:endParaRPr>
-          </a:p>
-          <a:p>
-            <a:r>
-              <a:rPr lang="en-US" sz="1000" dirty="0">
-                <a:solidFill>
-                  <a:srgbClr val="808080"/>
-                </a:solidFill>
-                <a:latin typeface="Cascadia Mono" panose="020B0609020000020004" pitchFamily="49" charset="0"/>
-              </a:rPr>
-              <a:t>#define</a:t>
-            </a:r>
-            <a:r>
-              <a:rPr lang="en-US" sz="1000" dirty="0">
-                <a:solidFill>
-                  <a:srgbClr val="000000"/>
-                </a:solidFill>
-                <a:latin typeface="Cascadia Mono" panose="020B0609020000020004" pitchFamily="49" charset="0"/>
-              </a:rPr>
-              <a:t> </a:t>
-            </a:r>
-            <a:r>
-              <a:rPr lang="en-US" sz="1000" dirty="0">
-                <a:solidFill>
-                  <a:srgbClr val="6F008A"/>
-                </a:solidFill>
-                <a:latin typeface="Cascadia Mono" panose="020B0609020000020004" pitchFamily="49" charset="0"/>
-              </a:rPr>
               <a:t>MAX31856_FAULT_OVUV</a:t>
             </a:r>
             <a:r>
@@ -10994,6 +11031,41 @@
               <a:t>///&lt; Fault status Thermocouple Open-Circuit Fault flag</a:t>
             </a:r>
             <a:endParaRPr lang="en-US" sz="1000" dirty="0"/>
+          </a:p>
+        </p:txBody>
+      </p:sp>
+      <p:sp>
+        <p:nvSpPr>
+          <p:cNvPr id="4" name="TextBox 3">
+            <a:extLst>
+              <a:ext uri="{FF2B5EF4-FFF2-40B4-BE49-F238E27FC236}">
+                <a16:creationId xmlns:a16="http://schemas.microsoft.com/office/drawing/2014/main" id="{233E93A7-2628-D7BB-6B5B-DC3EC9B8D3F0}"/>
+              </a:ext>
+            </a:extLst>
+          </p:cNvPr>
+          <p:cNvSpPr txBox="1"/>
+          <p:nvPr/>
+        </p:nvSpPr>
+        <p:spPr>
+          <a:xfrm>
+            <a:off x="8734425" y="3038475"/>
+            <a:ext cx="1907895" cy="369332"/>
+          </a:xfrm>
+          <a:prstGeom prst="rect">
+            <a:avLst/>
+          </a:prstGeom>
+          <a:noFill/>
+        </p:spPr>
+        <p:txBody>
+          <a:bodyPr wrap="none" rtlCol="0">
+            <a:spAutoFit/>
+          </a:bodyPr>
+          <a:lstStyle/>
+          <a:p>
+            <a:r>
+              <a:rPr lang="en-US"/>
+              <a:t>0x40 = 0100 0000</a:t>
+            </a:r>
           </a:p>
         </p:txBody>
       </p:sp>
@@ -12914,13 +12986,13 @@
           <p:nvPr>
             <p:extLst>
               <p:ext uri="{D42A27DB-BD31-4B8C-83A1-F6EECF244321}">
-                <p14:modId xmlns:p14="http://schemas.microsoft.com/office/powerpoint/2010/main" val="3066171805"/>
+                <p14:modId xmlns:p14="http://schemas.microsoft.com/office/powerpoint/2010/main" val="1298214199"/>
               </p:ext>
             </p:extLst>
           </p:nvPr>
         </p:nvGraphicFramePr>
         <p:xfrm>
-          <a:off x="8557484" y="2582092"/>
+          <a:off x="7419165" y="2767880"/>
           <a:ext cx="1874520" cy="975360"/>
         </p:xfrm>
         <a:graphic>
@@ -14661,7 +14733,7 @@
         </p:nvSpPr>
         <p:spPr>
           <a:xfrm>
-            <a:off x="8041338" y="2785482"/>
+            <a:off x="6903019" y="2971270"/>
             <a:ext cx="516146" cy="246221"/>
           </a:xfrm>
           <a:prstGeom prst="rect">
@@ -14699,7 +14771,7 @@
         </p:nvSpPr>
         <p:spPr>
           <a:xfrm>
-            <a:off x="8041338" y="3058347"/>
+            <a:off x="6903019" y="3244135"/>
             <a:ext cx="516146" cy="246221"/>
           </a:xfrm>
           <a:prstGeom prst="rect">
@@ -14737,7 +14809,7 @@
         </p:nvSpPr>
         <p:spPr>
           <a:xfrm>
-            <a:off x="7517311" y="3312450"/>
+            <a:off x="6378992" y="3498238"/>
             <a:ext cx="1048054" cy="246221"/>
           </a:xfrm>
           <a:prstGeom prst="rect">
@@ -14781,7 +14853,7 @@
         </p:nvSpPr>
         <p:spPr>
           <a:xfrm>
-            <a:off x="8485936" y="3594141"/>
+            <a:off x="7347617" y="3779929"/>
             <a:ext cx="2776722" cy="246221"/>
           </a:xfrm>
           <a:prstGeom prst="rect">
@@ -14799,6 +14871,2635 @@
               <a:rPr lang="en-US" sz="1000" dirty="0"/>
               <a:t>Bits 6 -0 are unchanged, only bit 7 is forced to 0</a:t>
             </a:r>
+          </a:p>
+        </p:txBody>
+      </p:sp>
+      <p:sp>
+        <p:nvSpPr>
+          <p:cNvPr id="20" name="TextBox 19">
+            <a:extLst>
+              <a:ext uri="{FF2B5EF4-FFF2-40B4-BE49-F238E27FC236}">
+                <a16:creationId xmlns:a16="http://schemas.microsoft.com/office/drawing/2014/main" id="{C41B9CA4-8D62-1955-8CD7-9340F1E3DEFF}"/>
+              </a:ext>
+            </a:extLst>
+          </p:cNvPr>
+          <p:cNvSpPr txBox="1"/>
+          <p:nvPr/>
+        </p:nvSpPr>
+        <p:spPr>
+          <a:xfrm>
+            <a:off x="5792530" y="5118847"/>
+            <a:ext cx="8985578" cy="10095071"/>
+          </a:xfrm>
+          <a:prstGeom prst="rect">
+            <a:avLst/>
+          </a:prstGeom>
+          <a:noFill/>
+        </p:spPr>
+        <p:txBody>
+          <a:bodyPr wrap="square">
+            <a:spAutoFit/>
+          </a:bodyPr>
+          <a:lstStyle/>
+          <a:p>
+            <a:r>
+              <a:rPr lang="en-US" sz="1000" dirty="0">
+                <a:solidFill>
+                  <a:srgbClr val="008000"/>
+                </a:solidFill>
+                <a:latin typeface="Cascadia Mono" panose="020B0609020000020004" pitchFamily="49" charset="0"/>
+              </a:rPr>
+              <a:t>/*!</a:t>
+            </a:r>
+            <a:endParaRPr lang="en-US" sz="1000" dirty="0">
+              <a:solidFill>
+                <a:srgbClr val="000000"/>
+              </a:solidFill>
+              <a:latin typeface="Cascadia Mono" panose="020B0609020000020004" pitchFamily="49" charset="0"/>
+            </a:endParaRPr>
+          </a:p>
+          <a:p>
+            <a:r>
+              <a:rPr lang="en-US" sz="1000" dirty="0">
+                <a:solidFill>
+                  <a:srgbClr val="008000"/>
+                </a:solidFill>
+                <a:latin typeface="Cascadia Mono" panose="020B0609020000020004" pitchFamily="49" charset="0"/>
+              </a:rPr>
+              <a:t> *    @brief  Write some data, then read some data from SPI into another buffer.</a:t>
+            </a:r>
+            <a:endParaRPr lang="en-US" sz="1000" dirty="0">
+              <a:solidFill>
+                <a:srgbClr val="000000"/>
+              </a:solidFill>
+              <a:latin typeface="Cascadia Mono" panose="020B0609020000020004" pitchFamily="49" charset="0"/>
+            </a:endParaRPr>
+          </a:p>
+          <a:p>
+            <a:r>
+              <a:rPr lang="en-US" sz="1000" dirty="0">
+                <a:solidFill>
+                  <a:srgbClr val="008000"/>
+                </a:solidFill>
+                <a:latin typeface="Cascadia Mono" panose="020B0609020000020004" pitchFamily="49" charset="0"/>
+              </a:rPr>
+              <a:t> * The buffers can point to same/overlapping locations. This does not</a:t>
+            </a:r>
+            <a:endParaRPr lang="en-US" sz="1000" dirty="0">
+              <a:solidFill>
+                <a:srgbClr val="000000"/>
+              </a:solidFill>
+              <a:latin typeface="Cascadia Mono" panose="020B0609020000020004" pitchFamily="49" charset="0"/>
+            </a:endParaRPr>
+          </a:p>
+          <a:p>
+            <a:r>
+              <a:rPr lang="en-US" sz="1000" dirty="0">
+                <a:solidFill>
+                  <a:srgbClr val="008000"/>
+                </a:solidFill>
+                <a:latin typeface="Cascadia Mono" panose="020B0609020000020004" pitchFamily="49" charset="0"/>
+              </a:rPr>
+              <a:t> * transmit-receive at the same time!</a:t>
+            </a:r>
+            <a:endParaRPr lang="en-US" sz="1000" dirty="0">
+              <a:solidFill>
+                <a:srgbClr val="000000"/>
+              </a:solidFill>
+              <a:latin typeface="Cascadia Mono" panose="020B0609020000020004" pitchFamily="49" charset="0"/>
+            </a:endParaRPr>
+          </a:p>
+          <a:p>
+            <a:r>
+              <a:rPr lang="en-US" sz="1000" dirty="0">
+                <a:solidFill>
+                  <a:srgbClr val="008000"/>
+                </a:solidFill>
+                <a:latin typeface="Cascadia Mono" panose="020B0609020000020004" pitchFamily="49" charset="0"/>
+              </a:rPr>
+              <a:t> *    @param  </a:t>
+            </a:r>
+            <a:r>
+              <a:rPr lang="en-US" sz="1000" dirty="0" err="1">
+                <a:solidFill>
+                  <a:srgbClr val="008000"/>
+                </a:solidFill>
+                <a:latin typeface="Cascadia Mono" panose="020B0609020000020004" pitchFamily="49" charset="0"/>
+              </a:rPr>
+              <a:t>write_buffer</a:t>
+            </a:r>
+            <a:r>
+              <a:rPr lang="en-US" sz="1000" dirty="0">
+                <a:solidFill>
+                  <a:srgbClr val="008000"/>
+                </a:solidFill>
+                <a:latin typeface="Cascadia Mono" panose="020B0609020000020004" pitchFamily="49" charset="0"/>
+              </a:rPr>
+              <a:t> Pointer to buffer of data to write from</a:t>
+            </a:r>
+            <a:endParaRPr lang="en-US" sz="1000" dirty="0">
+              <a:solidFill>
+                <a:srgbClr val="000000"/>
+              </a:solidFill>
+              <a:latin typeface="Cascadia Mono" panose="020B0609020000020004" pitchFamily="49" charset="0"/>
+            </a:endParaRPr>
+          </a:p>
+          <a:p>
+            <a:r>
+              <a:rPr lang="en-US" sz="1000" dirty="0">
+                <a:solidFill>
+                  <a:srgbClr val="008000"/>
+                </a:solidFill>
+                <a:latin typeface="Cascadia Mono" panose="020B0609020000020004" pitchFamily="49" charset="0"/>
+              </a:rPr>
+              <a:t> *    @param  </a:t>
+            </a:r>
+            <a:r>
+              <a:rPr lang="en-US" sz="1000" dirty="0" err="1">
+                <a:solidFill>
+                  <a:srgbClr val="008000"/>
+                </a:solidFill>
+                <a:latin typeface="Cascadia Mono" panose="020B0609020000020004" pitchFamily="49" charset="0"/>
+              </a:rPr>
+              <a:t>write_len</a:t>
+            </a:r>
+            <a:r>
+              <a:rPr lang="en-US" sz="1000" dirty="0">
+                <a:solidFill>
+                  <a:srgbClr val="008000"/>
+                </a:solidFill>
+                <a:latin typeface="Cascadia Mono" panose="020B0609020000020004" pitchFamily="49" charset="0"/>
+              </a:rPr>
+              <a:t> Number of bytes from buffer to write.</a:t>
+            </a:r>
+            <a:endParaRPr lang="en-US" sz="1000" dirty="0">
+              <a:solidFill>
+                <a:srgbClr val="000000"/>
+              </a:solidFill>
+              <a:latin typeface="Cascadia Mono" panose="020B0609020000020004" pitchFamily="49" charset="0"/>
+            </a:endParaRPr>
+          </a:p>
+          <a:p>
+            <a:r>
+              <a:rPr lang="en-US" sz="1000" dirty="0">
+                <a:solidFill>
+                  <a:srgbClr val="008000"/>
+                </a:solidFill>
+                <a:latin typeface="Cascadia Mono" panose="020B0609020000020004" pitchFamily="49" charset="0"/>
+              </a:rPr>
+              <a:t> *    @param  </a:t>
+            </a:r>
+            <a:r>
+              <a:rPr lang="en-US" sz="1000" dirty="0" err="1">
+                <a:solidFill>
+                  <a:srgbClr val="008000"/>
+                </a:solidFill>
+                <a:latin typeface="Cascadia Mono" panose="020B0609020000020004" pitchFamily="49" charset="0"/>
+              </a:rPr>
+              <a:t>read_buffer</a:t>
+            </a:r>
+            <a:r>
+              <a:rPr lang="en-US" sz="1000" dirty="0">
+                <a:solidFill>
+                  <a:srgbClr val="008000"/>
+                </a:solidFill>
+                <a:latin typeface="Cascadia Mono" panose="020B0609020000020004" pitchFamily="49" charset="0"/>
+              </a:rPr>
+              <a:t> Pointer to buffer of data to read into.</a:t>
+            </a:r>
+            <a:endParaRPr lang="en-US" sz="1000" dirty="0">
+              <a:solidFill>
+                <a:srgbClr val="000000"/>
+              </a:solidFill>
+              <a:latin typeface="Cascadia Mono" panose="020B0609020000020004" pitchFamily="49" charset="0"/>
+            </a:endParaRPr>
+          </a:p>
+          <a:p>
+            <a:r>
+              <a:rPr lang="en-US" sz="1000" dirty="0">
+                <a:solidFill>
+                  <a:srgbClr val="008000"/>
+                </a:solidFill>
+                <a:latin typeface="Cascadia Mono" panose="020B0609020000020004" pitchFamily="49" charset="0"/>
+              </a:rPr>
+              <a:t> *    @param  </a:t>
+            </a:r>
+            <a:r>
+              <a:rPr lang="en-US" sz="1000" dirty="0" err="1">
+                <a:solidFill>
+                  <a:srgbClr val="008000"/>
+                </a:solidFill>
+                <a:latin typeface="Cascadia Mono" panose="020B0609020000020004" pitchFamily="49" charset="0"/>
+              </a:rPr>
+              <a:t>read_len</a:t>
+            </a:r>
+            <a:r>
+              <a:rPr lang="en-US" sz="1000" dirty="0">
+                <a:solidFill>
+                  <a:srgbClr val="008000"/>
+                </a:solidFill>
+                <a:latin typeface="Cascadia Mono" panose="020B0609020000020004" pitchFamily="49" charset="0"/>
+              </a:rPr>
+              <a:t> Number of bytes from buffer to read.</a:t>
+            </a:r>
+            <a:endParaRPr lang="en-US" sz="1000" dirty="0">
+              <a:solidFill>
+                <a:srgbClr val="000000"/>
+              </a:solidFill>
+              <a:latin typeface="Cascadia Mono" panose="020B0609020000020004" pitchFamily="49" charset="0"/>
+            </a:endParaRPr>
+          </a:p>
+          <a:p>
+            <a:r>
+              <a:rPr lang="en-US" sz="1000" dirty="0">
+                <a:solidFill>
+                  <a:srgbClr val="008000"/>
+                </a:solidFill>
+                <a:latin typeface="Cascadia Mono" panose="020B0609020000020004" pitchFamily="49" charset="0"/>
+              </a:rPr>
+              <a:t> *    @param  </a:t>
+            </a:r>
+            <a:r>
+              <a:rPr lang="en-US" sz="1000" dirty="0" err="1">
+                <a:solidFill>
+                  <a:srgbClr val="008000"/>
+                </a:solidFill>
+                <a:latin typeface="Cascadia Mono" panose="020B0609020000020004" pitchFamily="49" charset="0"/>
+              </a:rPr>
+              <a:t>sendvalue</a:t>
+            </a:r>
+            <a:r>
+              <a:rPr lang="en-US" sz="1000" dirty="0">
+                <a:solidFill>
+                  <a:srgbClr val="008000"/>
+                </a:solidFill>
+                <a:latin typeface="Cascadia Mono" panose="020B0609020000020004" pitchFamily="49" charset="0"/>
+              </a:rPr>
+              <a:t> The 8-bits of data to write when doing the data read,</a:t>
+            </a:r>
+            <a:endParaRPr lang="en-US" sz="1000" dirty="0">
+              <a:solidFill>
+                <a:srgbClr val="000000"/>
+              </a:solidFill>
+              <a:latin typeface="Cascadia Mono" panose="020B0609020000020004" pitchFamily="49" charset="0"/>
+            </a:endParaRPr>
+          </a:p>
+          <a:p>
+            <a:r>
+              <a:rPr lang="en-US" sz="1000" dirty="0">
+                <a:solidFill>
+                  <a:srgbClr val="008000"/>
+                </a:solidFill>
+                <a:latin typeface="Cascadia Mono" panose="020B0609020000020004" pitchFamily="49" charset="0"/>
+              </a:rPr>
+              <a:t> * defaults to 0xFF</a:t>
+            </a:r>
+            <a:endParaRPr lang="en-US" sz="1000" dirty="0">
+              <a:solidFill>
+                <a:srgbClr val="000000"/>
+              </a:solidFill>
+              <a:latin typeface="Cascadia Mono" panose="020B0609020000020004" pitchFamily="49" charset="0"/>
+            </a:endParaRPr>
+          </a:p>
+          <a:p>
+            <a:r>
+              <a:rPr lang="en-US" sz="1000" dirty="0">
+                <a:solidFill>
+                  <a:srgbClr val="008000"/>
+                </a:solidFill>
+                <a:latin typeface="Cascadia Mono" panose="020B0609020000020004" pitchFamily="49" charset="0"/>
+              </a:rPr>
+              <a:t> *    @return Always returns true because there's no way to test success of SPI</a:t>
+            </a:r>
+            <a:endParaRPr lang="en-US" sz="1000" dirty="0">
+              <a:solidFill>
+                <a:srgbClr val="000000"/>
+              </a:solidFill>
+              <a:latin typeface="Cascadia Mono" panose="020B0609020000020004" pitchFamily="49" charset="0"/>
+            </a:endParaRPr>
+          </a:p>
+          <a:p>
+            <a:r>
+              <a:rPr lang="en-US" sz="1000" dirty="0">
+                <a:solidFill>
+                  <a:srgbClr val="008000"/>
+                </a:solidFill>
+                <a:latin typeface="Cascadia Mono" panose="020B0609020000020004" pitchFamily="49" charset="0"/>
+              </a:rPr>
+              <a:t> * writes</a:t>
+            </a:r>
+            <a:endParaRPr lang="en-US" sz="1000" dirty="0">
+              <a:solidFill>
+                <a:srgbClr val="000000"/>
+              </a:solidFill>
+              <a:latin typeface="Cascadia Mono" panose="020B0609020000020004" pitchFamily="49" charset="0"/>
+            </a:endParaRPr>
+          </a:p>
+          <a:p>
+            <a:r>
+              <a:rPr lang="en-US" sz="1000" dirty="0">
+                <a:solidFill>
+                  <a:srgbClr val="008000"/>
+                </a:solidFill>
+                <a:latin typeface="Cascadia Mono" panose="020B0609020000020004" pitchFamily="49" charset="0"/>
+              </a:rPr>
+              <a:t> */</a:t>
+            </a:r>
+            <a:endParaRPr lang="en-US" sz="1000" dirty="0">
+              <a:solidFill>
+                <a:srgbClr val="000000"/>
+              </a:solidFill>
+              <a:latin typeface="Cascadia Mono" panose="020B0609020000020004" pitchFamily="49" charset="0"/>
+            </a:endParaRPr>
+          </a:p>
+          <a:p>
+            <a:r>
+              <a:rPr lang="en-US" sz="1000" dirty="0">
+                <a:solidFill>
+                  <a:srgbClr val="0000FF"/>
+                </a:solidFill>
+                <a:latin typeface="Cascadia Mono" panose="020B0609020000020004" pitchFamily="49" charset="0"/>
+              </a:rPr>
+              <a:t>bool</a:t>
+            </a:r>
+            <a:r>
+              <a:rPr lang="en-US" sz="1000" dirty="0">
+                <a:solidFill>
+                  <a:srgbClr val="000000"/>
+                </a:solidFill>
+                <a:latin typeface="Cascadia Mono" panose="020B0609020000020004" pitchFamily="49" charset="0"/>
+              </a:rPr>
+              <a:t> </a:t>
+            </a:r>
+            <a:r>
+              <a:rPr lang="en-US" sz="1000" dirty="0" err="1">
+                <a:solidFill>
+                  <a:srgbClr val="2B91AF"/>
+                </a:solidFill>
+                <a:latin typeface="Cascadia Mono" panose="020B0609020000020004" pitchFamily="49" charset="0"/>
+              </a:rPr>
+              <a:t>Adafruit_SPIDevice</a:t>
+            </a:r>
+            <a:r>
+              <a:rPr lang="en-US" sz="1000" dirty="0">
+                <a:solidFill>
+                  <a:srgbClr val="000000"/>
+                </a:solidFill>
+                <a:latin typeface="Cascadia Mono" panose="020B0609020000020004" pitchFamily="49" charset="0"/>
+              </a:rPr>
+              <a:t>::</a:t>
+            </a:r>
+            <a:r>
+              <a:rPr lang="en-US" sz="1000" dirty="0" err="1">
+                <a:solidFill>
+                  <a:srgbClr val="000000"/>
+                </a:solidFill>
+                <a:latin typeface="Cascadia Mono" panose="020B0609020000020004" pitchFamily="49" charset="0"/>
+              </a:rPr>
+              <a:t>write_then_read</a:t>
+            </a:r>
+            <a:r>
+              <a:rPr lang="en-US" sz="1000" dirty="0">
+                <a:solidFill>
+                  <a:srgbClr val="000000"/>
+                </a:solidFill>
+                <a:latin typeface="Cascadia Mono" panose="020B0609020000020004" pitchFamily="49" charset="0"/>
+              </a:rPr>
+              <a:t>(uint8_t *</a:t>
+            </a:r>
+            <a:r>
+              <a:rPr lang="en-US" sz="1000" dirty="0" err="1">
+                <a:solidFill>
+                  <a:srgbClr val="808080"/>
+                </a:solidFill>
+                <a:latin typeface="Cascadia Mono" panose="020B0609020000020004" pitchFamily="49" charset="0"/>
+              </a:rPr>
+              <a:t>write_buffer</a:t>
+            </a:r>
+            <a:r>
+              <a:rPr lang="en-US" sz="1000" dirty="0">
+                <a:solidFill>
+                  <a:srgbClr val="000000"/>
+                </a:solidFill>
+                <a:latin typeface="Cascadia Mono" panose="020B0609020000020004" pitchFamily="49" charset="0"/>
+              </a:rPr>
+              <a:t>,</a:t>
+            </a:r>
+          </a:p>
+          <a:p>
+            <a:r>
+              <a:rPr lang="en-US" sz="1000" dirty="0">
+                <a:solidFill>
+                  <a:srgbClr val="000000"/>
+                </a:solidFill>
+                <a:latin typeface="Cascadia Mono" panose="020B0609020000020004" pitchFamily="49" charset="0"/>
+              </a:rPr>
+              <a:t>                                         </a:t>
+            </a:r>
+            <a:r>
+              <a:rPr lang="en-US" sz="1000" dirty="0" err="1">
+                <a:solidFill>
+                  <a:srgbClr val="2B91AF"/>
+                </a:solidFill>
+                <a:latin typeface="Cascadia Mono" panose="020B0609020000020004" pitchFamily="49" charset="0"/>
+              </a:rPr>
+              <a:t>size_t</a:t>
+            </a:r>
+            <a:r>
+              <a:rPr lang="en-US" sz="1000" dirty="0">
+                <a:solidFill>
+                  <a:srgbClr val="000000"/>
+                </a:solidFill>
+                <a:latin typeface="Cascadia Mono" panose="020B0609020000020004" pitchFamily="49" charset="0"/>
+              </a:rPr>
+              <a:t> </a:t>
+            </a:r>
+            <a:r>
+              <a:rPr lang="en-US" sz="1000" dirty="0" err="1">
+                <a:solidFill>
+                  <a:srgbClr val="808080"/>
+                </a:solidFill>
+                <a:latin typeface="Cascadia Mono" panose="020B0609020000020004" pitchFamily="49" charset="0"/>
+              </a:rPr>
+              <a:t>write_len</a:t>
+            </a:r>
+            <a:r>
+              <a:rPr lang="en-US" sz="1000" dirty="0">
+                <a:solidFill>
+                  <a:srgbClr val="000000"/>
+                </a:solidFill>
+                <a:latin typeface="Cascadia Mono" panose="020B0609020000020004" pitchFamily="49" charset="0"/>
+              </a:rPr>
+              <a:t>, uint8_t *</a:t>
+            </a:r>
+            <a:r>
+              <a:rPr lang="en-US" sz="1000" dirty="0" err="1">
+                <a:solidFill>
+                  <a:srgbClr val="808080"/>
+                </a:solidFill>
+                <a:latin typeface="Cascadia Mono" panose="020B0609020000020004" pitchFamily="49" charset="0"/>
+              </a:rPr>
+              <a:t>read_buffer</a:t>
+            </a:r>
+            <a:r>
+              <a:rPr lang="en-US" sz="1000" dirty="0">
+                <a:solidFill>
+                  <a:srgbClr val="000000"/>
+                </a:solidFill>
+                <a:latin typeface="Cascadia Mono" panose="020B0609020000020004" pitchFamily="49" charset="0"/>
+              </a:rPr>
+              <a:t>,</a:t>
+            </a:r>
+          </a:p>
+          <a:p>
+            <a:r>
+              <a:rPr lang="en-US" sz="1000" dirty="0">
+                <a:solidFill>
+                  <a:srgbClr val="000000"/>
+                </a:solidFill>
+                <a:latin typeface="Cascadia Mono" panose="020B0609020000020004" pitchFamily="49" charset="0"/>
+              </a:rPr>
+              <a:t>                                         </a:t>
+            </a:r>
+            <a:r>
+              <a:rPr lang="en-US" sz="1000" dirty="0" err="1">
+                <a:solidFill>
+                  <a:srgbClr val="2B91AF"/>
+                </a:solidFill>
+                <a:latin typeface="Cascadia Mono" panose="020B0609020000020004" pitchFamily="49" charset="0"/>
+              </a:rPr>
+              <a:t>size_t</a:t>
+            </a:r>
+            <a:r>
+              <a:rPr lang="en-US" sz="1000" dirty="0">
+                <a:solidFill>
+                  <a:srgbClr val="000000"/>
+                </a:solidFill>
+                <a:latin typeface="Cascadia Mono" panose="020B0609020000020004" pitchFamily="49" charset="0"/>
+              </a:rPr>
+              <a:t> </a:t>
+            </a:r>
+            <a:r>
+              <a:rPr lang="en-US" sz="1000" dirty="0" err="1">
+                <a:solidFill>
+                  <a:srgbClr val="808080"/>
+                </a:solidFill>
+                <a:latin typeface="Cascadia Mono" panose="020B0609020000020004" pitchFamily="49" charset="0"/>
+              </a:rPr>
+              <a:t>read_len</a:t>
+            </a:r>
+            <a:r>
+              <a:rPr lang="en-US" sz="1000" dirty="0">
+                <a:solidFill>
+                  <a:srgbClr val="000000"/>
+                </a:solidFill>
+                <a:latin typeface="Cascadia Mono" panose="020B0609020000020004" pitchFamily="49" charset="0"/>
+              </a:rPr>
+              <a:t>, uint8_t </a:t>
+            </a:r>
+            <a:r>
+              <a:rPr lang="en-US" sz="1000" dirty="0" err="1">
+                <a:solidFill>
+                  <a:srgbClr val="808080"/>
+                </a:solidFill>
+                <a:latin typeface="Cascadia Mono" panose="020B0609020000020004" pitchFamily="49" charset="0"/>
+              </a:rPr>
+              <a:t>sendvalue</a:t>
+            </a:r>
+            <a:r>
+              <a:rPr lang="en-US" sz="1000" dirty="0">
+                <a:solidFill>
+                  <a:srgbClr val="000000"/>
+                </a:solidFill>
+                <a:latin typeface="Cascadia Mono" panose="020B0609020000020004" pitchFamily="49" charset="0"/>
+              </a:rPr>
+              <a:t>) {</a:t>
+            </a:r>
+          </a:p>
+          <a:p>
+            <a:r>
+              <a:rPr lang="en-US" sz="1000" dirty="0">
+                <a:solidFill>
+                  <a:srgbClr val="000000"/>
+                </a:solidFill>
+                <a:latin typeface="Cascadia Mono" panose="020B0609020000020004" pitchFamily="49" charset="0"/>
+              </a:rPr>
+              <a:t>  </a:t>
+            </a:r>
+            <a:r>
+              <a:rPr lang="en-US" sz="1000" dirty="0">
+                <a:solidFill>
+                  <a:srgbClr val="0000FF"/>
+                </a:solidFill>
+                <a:latin typeface="Cascadia Mono" panose="020B0609020000020004" pitchFamily="49" charset="0"/>
+              </a:rPr>
+              <a:t>if</a:t>
+            </a:r>
+            <a:r>
+              <a:rPr lang="en-US" sz="1000" dirty="0">
+                <a:solidFill>
+                  <a:srgbClr val="000000"/>
+                </a:solidFill>
+                <a:latin typeface="Cascadia Mono" panose="020B0609020000020004" pitchFamily="49" charset="0"/>
+              </a:rPr>
+              <a:t> (_</a:t>
+            </a:r>
+            <a:r>
+              <a:rPr lang="en-US" sz="1000" dirty="0" err="1">
+                <a:solidFill>
+                  <a:srgbClr val="000000"/>
+                </a:solidFill>
+                <a:latin typeface="Cascadia Mono" panose="020B0609020000020004" pitchFamily="49" charset="0"/>
+              </a:rPr>
+              <a:t>spi</a:t>
+            </a:r>
+            <a:r>
+              <a:rPr lang="en-US" sz="1000" dirty="0">
+                <a:solidFill>
+                  <a:srgbClr val="000000"/>
+                </a:solidFill>
+                <a:latin typeface="Cascadia Mono" panose="020B0609020000020004" pitchFamily="49" charset="0"/>
+              </a:rPr>
+              <a:t>) {</a:t>
+            </a:r>
+          </a:p>
+          <a:p>
+            <a:r>
+              <a:rPr lang="en-US" sz="1000" dirty="0">
+                <a:solidFill>
+                  <a:srgbClr val="000000"/>
+                </a:solidFill>
+                <a:latin typeface="Cascadia Mono" panose="020B0609020000020004" pitchFamily="49" charset="0"/>
+              </a:rPr>
+              <a:t>    _</a:t>
+            </a:r>
+            <a:r>
+              <a:rPr lang="en-US" sz="1000" dirty="0" err="1">
+                <a:solidFill>
+                  <a:srgbClr val="000000"/>
+                </a:solidFill>
+                <a:latin typeface="Cascadia Mono" panose="020B0609020000020004" pitchFamily="49" charset="0"/>
+              </a:rPr>
+              <a:t>spi</a:t>
+            </a:r>
+            <a:r>
+              <a:rPr lang="en-US" sz="1000" dirty="0">
+                <a:solidFill>
+                  <a:srgbClr val="000000"/>
+                </a:solidFill>
+                <a:latin typeface="Cascadia Mono" panose="020B0609020000020004" pitchFamily="49" charset="0"/>
+              </a:rPr>
+              <a:t>-&gt;</a:t>
+            </a:r>
+            <a:r>
+              <a:rPr lang="en-US" sz="1000" dirty="0" err="1">
+                <a:solidFill>
+                  <a:srgbClr val="000000"/>
+                </a:solidFill>
+                <a:latin typeface="Cascadia Mono" panose="020B0609020000020004" pitchFamily="49" charset="0"/>
+              </a:rPr>
+              <a:t>beginTransaction</a:t>
+            </a:r>
+            <a:r>
+              <a:rPr lang="en-US" sz="1000" dirty="0">
+                <a:solidFill>
+                  <a:srgbClr val="000000"/>
+                </a:solidFill>
+                <a:latin typeface="Cascadia Mono" panose="020B0609020000020004" pitchFamily="49" charset="0"/>
+              </a:rPr>
+              <a:t>(*_</a:t>
+            </a:r>
+            <a:r>
+              <a:rPr lang="en-US" sz="1000" dirty="0" err="1">
+                <a:solidFill>
+                  <a:srgbClr val="000000"/>
+                </a:solidFill>
+                <a:latin typeface="Cascadia Mono" panose="020B0609020000020004" pitchFamily="49" charset="0"/>
+              </a:rPr>
+              <a:t>spiSetting</a:t>
+            </a:r>
+            <a:r>
+              <a:rPr lang="en-US" sz="1000" dirty="0">
+                <a:solidFill>
+                  <a:srgbClr val="000000"/>
+                </a:solidFill>
+                <a:latin typeface="Cascadia Mono" panose="020B0609020000020004" pitchFamily="49" charset="0"/>
+              </a:rPr>
+              <a:t>);</a:t>
+            </a:r>
+          </a:p>
+          <a:p>
+            <a:r>
+              <a:rPr lang="en-US" sz="1000" dirty="0">
+                <a:solidFill>
+                  <a:srgbClr val="000000"/>
+                </a:solidFill>
+                <a:latin typeface="Cascadia Mono" panose="020B0609020000020004" pitchFamily="49" charset="0"/>
+              </a:rPr>
+              <a:t>  }</a:t>
+            </a:r>
+          </a:p>
+          <a:p>
+            <a:endParaRPr lang="en-US" sz="1000" dirty="0">
+              <a:solidFill>
+                <a:srgbClr val="000000"/>
+              </a:solidFill>
+              <a:latin typeface="Cascadia Mono" panose="020B0609020000020004" pitchFamily="49" charset="0"/>
+            </a:endParaRPr>
+          </a:p>
+          <a:p>
+            <a:r>
+              <a:rPr lang="en-US" sz="1000" dirty="0">
+                <a:solidFill>
+                  <a:srgbClr val="000000"/>
+                </a:solidFill>
+                <a:latin typeface="Cascadia Mono" panose="020B0609020000020004" pitchFamily="49" charset="0"/>
+              </a:rPr>
+              <a:t>  </a:t>
+            </a:r>
+            <a:r>
+              <a:rPr lang="en-US" sz="1000" dirty="0" err="1">
+                <a:solidFill>
+                  <a:srgbClr val="000000"/>
+                </a:solidFill>
+                <a:latin typeface="Cascadia Mono" panose="020B0609020000020004" pitchFamily="49" charset="0"/>
+              </a:rPr>
+              <a:t>digitalWrite</a:t>
+            </a:r>
+            <a:r>
+              <a:rPr lang="en-US" sz="1000" dirty="0">
+                <a:solidFill>
+                  <a:srgbClr val="000000"/>
+                </a:solidFill>
+                <a:latin typeface="Cascadia Mono" panose="020B0609020000020004" pitchFamily="49" charset="0"/>
+              </a:rPr>
+              <a:t>(_cs, LOW);</a:t>
+            </a:r>
+          </a:p>
+          <a:p>
+            <a:r>
+              <a:rPr lang="en-US" sz="1000" dirty="0">
+                <a:solidFill>
+                  <a:srgbClr val="000000"/>
+                </a:solidFill>
+                <a:latin typeface="Cascadia Mono" panose="020B0609020000020004" pitchFamily="49" charset="0"/>
+              </a:rPr>
+              <a:t>  </a:t>
+            </a:r>
+            <a:r>
+              <a:rPr lang="en-US" sz="1000" dirty="0">
+                <a:solidFill>
+                  <a:srgbClr val="008000"/>
+                </a:solidFill>
+                <a:latin typeface="Cascadia Mono" panose="020B0609020000020004" pitchFamily="49" charset="0"/>
+              </a:rPr>
+              <a:t>// do the writing</a:t>
+            </a:r>
+            <a:endParaRPr lang="en-US" sz="1000" dirty="0">
+              <a:solidFill>
+                <a:srgbClr val="000000"/>
+              </a:solidFill>
+              <a:latin typeface="Cascadia Mono" panose="020B0609020000020004" pitchFamily="49" charset="0"/>
+            </a:endParaRPr>
+          </a:p>
+          <a:p>
+            <a:r>
+              <a:rPr lang="en-US" sz="1000" dirty="0">
+                <a:solidFill>
+                  <a:srgbClr val="000000"/>
+                </a:solidFill>
+                <a:latin typeface="Cascadia Mono" panose="020B0609020000020004" pitchFamily="49" charset="0"/>
+              </a:rPr>
+              <a:t>  </a:t>
+            </a:r>
+            <a:r>
+              <a:rPr lang="en-US" sz="1000" dirty="0">
+                <a:solidFill>
+                  <a:srgbClr val="0000FF"/>
+                </a:solidFill>
+                <a:latin typeface="Cascadia Mono" panose="020B0609020000020004" pitchFamily="49" charset="0"/>
+              </a:rPr>
+              <a:t>for</a:t>
+            </a:r>
+            <a:r>
+              <a:rPr lang="en-US" sz="1000" dirty="0">
+                <a:solidFill>
+                  <a:srgbClr val="000000"/>
+                </a:solidFill>
+                <a:latin typeface="Cascadia Mono" panose="020B0609020000020004" pitchFamily="49" charset="0"/>
+              </a:rPr>
+              <a:t> (</a:t>
+            </a:r>
+            <a:r>
+              <a:rPr lang="en-US" sz="1000" dirty="0" err="1">
+                <a:solidFill>
+                  <a:srgbClr val="2B91AF"/>
+                </a:solidFill>
+                <a:latin typeface="Cascadia Mono" panose="020B0609020000020004" pitchFamily="49" charset="0"/>
+              </a:rPr>
+              <a:t>size_t</a:t>
+            </a:r>
+            <a:r>
+              <a:rPr lang="en-US" sz="1000" dirty="0">
+                <a:solidFill>
+                  <a:srgbClr val="000000"/>
+                </a:solidFill>
+                <a:latin typeface="Cascadia Mono" panose="020B0609020000020004" pitchFamily="49" charset="0"/>
+              </a:rPr>
+              <a:t> </a:t>
+            </a:r>
+            <a:r>
+              <a:rPr lang="en-US" sz="1000" dirty="0" err="1">
+                <a:solidFill>
+                  <a:srgbClr val="000000"/>
+                </a:solidFill>
+                <a:latin typeface="Cascadia Mono" panose="020B0609020000020004" pitchFamily="49" charset="0"/>
+              </a:rPr>
+              <a:t>i</a:t>
+            </a:r>
+            <a:r>
+              <a:rPr lang="en-US" sz="1000" dirty="0">
+                <a:solidFill>
+                  <a:srgbClr val="000000"/>
+                </a:solidFill>
+                <a:latin typeface="Cascadia Mono" panose="020B0609020000020004" pitchFamily="49" charset="0"/>
+              </a:rPr>
+              <a:t> = 0; </a:t>
+            </a:r>
+            <a:r>
+              <a:rPr lang="en-US" sz="1000" dirty="0" err="1">
+                <a:solidFill>
+                  <a:srgbClr val="000000"/>
+                </a:solidFill>
+                <a:latin typeface="Cascadia Mono" panose="020B0609020000020004" pitchFamily="49" charset="0"/>
+              </a:rPr>
+              <a:t>i</a:t>
+            </a:r>
+            <a:r>
+              <a:rPr lang="en-US" sz="1000" dirty="0">
+                <a:solidFill>
+                  <a:srgbClr val="000000"/>
+                </a:solidFill>
+                <a:latin typeface="Cascadia Mono" panose="020B0609020000020004" pitchFamily="49" charset="0"/>
+              </a:rPr>
+              <a:t> &lt; </a:t>
+            </a:r>
+            <a:r>
+              <a:rPr lang="en-US" sz="1000" dirty="0" err="1">
+                <a:solidFill>
+                  <a:srgbClr val="808080"/>
+                </a:solidFill>
+                <a:latin typeface="Cascadia Mono" panose="020B0609020000020004" pitchFamily="49" charset="0"/>
+              </a:rPr>
+              <a:t>write_len</a:t>
+            </a:r>
+            <a:r>
+              <a:rPr lang="en-US" sz="1000" dirty="0">
+                <a:solidFill>
+                  <a:srgbClr val="000000"/>
+                </a:solidFill>
+                <a:latin typeface="Cascadia Mono" panose="020B0609020000020004" pitchFamily="49" charset="0"/>
+              </a:rPr>
+              <a:t>; </a:t>
+            </a:r>
+            <a:r>
+              <a:rPr lang="en-US" sz="1000" dirty="0" err="1">
+                <a:solidFill>
+                  <a:srgbClr val="000000"/>
+                </a:solidFill>
+                <a:latin typeface="Cascadia Mono" panose="020B0609020000020004" pitchFamily="49" charset="0"/>
+              </a:rPr>
+              <a:t>i</a:t>
+            </a:r>
+            <a:r>
+              <a:rPr lang="en-US" sz="1000" dirty="0">
+                <a:solidFill>
+                  <a:srgbClr val="000000"/>
+                </a:solidFill>
+                <a:latin typeface="Cascadia Mono" panose="020B0609020000020004" pitchFamily="49" charset="0"/>
+              </a:rPr>
+              <a:t>++) {</a:t>
+            </a:r>
+          </a:p>
+          <a:p>
+            <a:r>
+              <a:rPr lang="en-US" sz="1000" dirty="0">
+                <a:solidFill>
+                  <a:srgbClr val="000000"/>
+                </a:solidFill>
+                <a:latin typeface="Cascadia Mono" panose="020B0609020000020004" pitchFamily="49" charset="0"/>
+              </a:rPr>
+              <a:t>    transfer(</a:t>
+            </a:r>
+            <a:r>
+              <a:rPr lang="en-US" sz="1000" dirty="0" err="1">
+                <a:solidFill>
+                  <a:srgbClr val="808080"/>
+                </a:solidFill>
+                <a:latin typeface="Cascadia Mono" panose="020B0609020000020004" pitchFamily="49" charset="0"/>
+              </a:rPr>
+              <a:t>write_buffer</a:t>
+            </a:r>
+            <a:r>
+              <a:rPr lang="en-US" sz="1000" dirty="0">
+                <a:solidFill>
+                  <a:srgbClr val="000000"/>
+                </a:solidFill>
+                <a:latin typeface="Cascadia Mono" panose="020B0609020000020004" pitchFamily="49" charset="0"/>
+              </a:rPr>
+              <a:t>[</a:t>
+            </a:r>
+            <a:r>
+              <a:rPr lang="en-US" sz="1000" dirty="0" err="1">
+                <a:solidFill>
+                  <a:srgbClr val="000000"/>
+                </a:solidFill>
+                <a:latin typeface="Cascadia Mono" panose="020B0609020000020004" pitchFamily="49" charset="0"/>
+              </a:rPr>
+              <a:t>i</a:t>
+            </a:r>
+            <a:r>
+              <a:rPr lang="en-US" sz="1000" dirty="0">
+                <a:solidFill>
+                  <a:srgbClr val="000000"/>
+                </a:solidFill>
+                <a:latin typeface="Cascadia Mono" panose="020B0609020000020004" pitchFamily="49" charset="0"/>
+              </a:rPr>
+              <a:t>]);</a:t>
+            </a:r>
+          </a:p>
+          <a:p>
+            <a:r>
+              <a:rPr lang="en-US" sz="1000" dirty="0">
+                <a:solidFill>
+                  <a:srgbClr val="000000"/>
+                </a:solidFill>
+                <a:latin typeface="Cascadia Mono" panose="020B0609020000020004" pitchFamily="49" charset="0"/>
+              </a:rPr>
+              <a:t>  }</a:t>
+            </a:r>
+          </a:p>
+          <a:p>
+            <a:endParaRPr lang="en-US" sz="1000" dirty="0">
+              <a:solidFill>
+                <a:srgbClr val="000000"/>
+              </a:solidFill>
+              <a:latin typeface="Cascadia Mono" panose="020B0609020000020004" pitchFamily="49" charset="0"/>
+            </a:endParaRPr>
+          </a:p>
+          <a:p>
+            <a:r>
+              <a:rPr lang="en-US" sz="1000" dirty="0">
+                <a:solidFill>
+                  <a:srgbClr val="808080"/>
+                </a:solidFill>
+                <a:latin typeface="Cascadia Mono" panose="020B0609020000020004" pitchFamily="49" charset="0"/>
+              </a:rPr>
+              <a:t>#ifdef</a:t>
+            </a:r>
+            <a:r>
+              <a:rPr lang="en-US" sz="1000" dirty="0">
+                <a:solidFill>
+                  <a:srgbClr val="000000"/>
+                </a:solidFill>
+                <a:latin typeface="Cascadia Mono" panose="020B0609020000020004" pitchFamily="49" charset="0"/>
+              </a:rPr>
+              <a:t> DEBUG_SERIAL</a:t>
+            </a:r>
+          </a:p>
+          <a:p>
+            <a:r>
+              <a:rPr lang="en-US" sz="1000" dirty="0">
+                <a:solidFill>
+                  <a:srgbClr val="000000"/>
+                </a:solidFill>
+                <a:latin typeface="Cascadia Mono" panose="020B0609020000020004" pitchFamily="49" charset="0"/>
+              </a:rPr>
+              <a:t>  </a:t>
+            </a:r>
+            <a:r>
+              <a:rPr lang="en-US" sz="1000" dirty="0" err="1">
+                <a:solidFill>
+                  <a:srgbClr val="000000"/>
+                </a:solidFill>
+                <a:latin typeface="Cascadia Mono" panose="020B0609020000020004" pitchFamily="49" charset="0"/>
+              </a:rPr>
+              <a:t>DEBUG_SERIAL.print</a:t>
+            </a:r>
+            <a:r>
+              <a:rPr lang="en-US" sz="1000" dirty="0">
+                <a:solidFill>
+                  <a:srgbClr val="000000"/>
+                </a:solidFill>
+                <a:latin typeface="Cascadia Mono" panose="020B0609020000020004" pitchFamily="49" charset="0"/>
+              </a:rPr>
+              <a:t>(F(</a:t>
+            </a:r>
+            <a:r>
+              <a:rPr lang="en-US" sz="1000" dirty="0">
+                <a:solidFill>
+                  <a:srgbClr val="A31515"/>
+                </a:solidFill>
+                <a:latin typeface="Cascadia Mono" panose="020B0609020000020004" pitchFamily="49" charset="0"/>
+              </a:rPr>
+              <a:t>"\</a:t>
+            </a:r>
+            <a:r>
+              <a:rPr lang="en-US" sz="1000" dirty="0" err="1">
+                <a:solidFill>
+                  <a:srgbClr val="A31515"/>
+                </a:solidFill>
+                <a:latin typeface="Cascadia Mono" panose="020B0609020000020004" pitchFamily="49" charset="0"/>
+              </a:rPr>
+              <a:t>tSPIDevice</a:t>
+            </a:r>
+            <a:r>
+              <a:rPr lang="en-US" sz="1000" dirty="0">
+                <a:solidFill>
+                  <a:srgbClr val="A31515"/>
+                </a:solidFill>
+                <a:latin typeface="Cascadia Mono" panose="020B0609020000020004" pitchFamily="49" charset="0"/>
+              </a:rPr>
+              <a:t> Wrote: "</a:t>
+            </a:r>
+            <a:r>
+              <a:rPr lang="en-US" sz="1000" dirty="0">
+                <a:solidFill>
+                  <a:srgbClr val="000000"/>
+                </a:solidFill>
+                <a:latin typeface="Cascadia Mono" panose="020B0609020000020004" pitchFamily="49" charset="0"/>
+              </a:rPr>
+              <a:t>));</a:t>
+            </a:r>
+          </a:p>
+          <a:p>
+            <a:r>
+              <a:rPr lang="en-US" sz="1000" dirty="0">
+                <a:solidFill>
+                  <a:srgbClr val="000000"/>
+                </a:solidFill>
+                <a:latin typeface="Cascadia Mono" panose="020B0609020000020004" pitchFamily="49" charset="0"/>
+              </a:rPr>
+              <a:t>  </a:t>
+            </a:r>
+            <a:r>
+              <a:rPr lang="en-US" sz="1000" dirty="0">
+                <a:solidFill>
+                  <a:srgbClr val="0000FF"/>
+                </a:solidFill>
+                <a:latin typeface="Cascadia Mono" panose="020B0609020000020004" pitchFamily="49" charset="0"/>
+              </a:rPr>
+              <a:t>for</a:t>
+            </a:r>
+            <a:r>
+              <a:rPr lang="en-US" sz="1000" dirty="0">
+                <a:solidFill>
+                  <a:srgbClr val="000000"/>
+                </a:solidFill>
+                <a:latin typeface="Cascadia Mono" panose="020B0609020000020004" pitchFamily="49" charset="0"/>
+              </a:rPr>
+              <a:t> (uint16_t </a:t>
+            </a:r>
+            <a:r>
+              <a:rPr lang="en-US" sz="1000" dirty="0" err="1">
+                <a:solidFill>
+                  <a:srgbClr val="000000"/>
+                </a:solidFill>
+                <a:latin typeface="Cascadia Mono" panose="020B0609020000020004" pitchFamily="49" charset="0"/>
+              </a:rPr>
+              <a:t>i</a:t>
+            </a:r>
+            <a:r>
+              <a:rPr lang="en-US" sz="1000" dirty="0">
+                <a:solidFill>
+                  <a:srgbClr val="000000"/>
+                </a:solidFill>
+                <a:latin typeface="Cascadia Mono" panose="020B0609020000020004" pitchFamily="49" charset="0"/>
+              </a:rPr>
+              <a:t> = 0; </a:t>
+            </a:r>
+            <a:r>
+              <a:rPr lang="en-US" sz="1000" dirty="0" err="1">
+                <a:solidFill>
+                  <a:srgbClr val="000000"/>
+                </a:solidFill>
+                <a:latin typeface="Cascadia Mono" panose="020B0609020000020004" pitchFamily="49" charset="0"/>
+              </a:rPr>
+              <a:t>i</a:t>
+            </a:r>
+            <a:r>
+              <a:rPr lang="en-US" sz="1000" dirty="0">
+                <a:solidFill>
+                  <a:srgbClr val="000000"/>
+                </a:solidFill>
+                <a:latin typeface="Cascadia Mono" panose="020B0609020000020004" pitchFamily="49" charset="0"/>
+              </a:rPr>
+              <a:t> &lt; </a:t>
+            </a:r>
+            <a:r>
+              <a:rPr lang="en-US" sz="1000" dirty="0" err="1">
+                <a:solidFill>
+                  <a:srgbClr val="000000"/>
+                </a:solidFill>
+                <a:latin typeface="Cascadia Mono" panose="020B0609020000020004" pitchFamily="49" charset="0"/>
+              </a:rPr>
+              <a:t>write_len</a:t>
+            </a:r>
+            <a:r>
+              <a:rPr lang="en-US" sz="1000" dirty="0">
+                <a:solidFill>
+                  <a:srgbClr val="000000"/>
+                </a:solidFill>
+                <a:latin typeface="Cascadia Mono" panose="020B0609020000020004" pitchFamily="49" charset="0"/>
+              </a:rPr>
+              <a:t>; </a:t>
+            </a:r>
+            <a:r>
+              <a:rPr lang="en-US" sz="1000" dirty="0" err="1">
+                <a:solidFill>
+                  <a:srgbClr val="000000"/>
+                </a:solidFill>
+                <a:latin typeface="Cascadia Mono" panose="020B0609020000020004" pitchFamily="49" charset="0"/>
+              </a:rPr>
+              <a:t>i</a:t>
+            </a:r>
+            <a:r>
+              <a:rPr lang="en-US" sz="1000" dirty="0">
+                <a:solidFill>
+                  <a:srgbClr val="000000"/>
+                </a:solidFill>
+                <a:latin typeface="Cascadia Mono" panose="020B0609020000020004" pitchFamily="49" charset="0"/>
+              </a:rPr>
+              <a:t>++) {</a:t>
+            </a:r>
+          </a:p>
+          <a:p>
+            <a:r>
+              <a:rPr lang="en-US" sz="1000" dirty="0">
+                <a:solidFill>
+                  <a:srgbClr val="000000"/>
+                </a:solidFill>
+                <a:latin typeface="Cascadia Mono" panose="020B0609020000020004" pitchFamily="49" charset="0"/>
+              </a:rPr>
+              <a:t>    </a:t>
+            </a:r>
+            <a:r>
+              <a:rPr lang="en-US" sz="1000" dirty="0" err="1">
+                <a:solidFill>
+                  <a:srgbClr val="000000"/>
+                </a:solidFill>
+                <a:latin typeface="Cascadia Mono" panose="020B0609020000020004" pitchFamily="49" charset="0"/>
+              </a:rPr>
+              <a:t>DEBUG_SERIAL.print</a:t>
+            </a:r>
+            <a:r>
+              <a:rPr lang="en-US" sz="1000" dirty="0">
+                <a:solidFill>
+                  <a:srgbClr val="000000"/>
+                </a:solidFill>
+                <a:latin typeface="Cascadia Mono" panose="020B0609020000020004" pitchFamily="49" charset="0"/>
+              </a:rPr>
+              <a:t>(F(</a:t>
+            </a:r>
+            <a:r>
+              <a:rPr lang="en-US" sz="1000" dirty="0">
+                <a:solidFill>
+                  <a:srgbClr val="A31515"/>
+                </a:solidFill>
+                <a:latin typeface="Cascadia Mono" panose="020B0609020000020004" pitchFamily="49" charset="0"/>
+              </a:rPr>
+              <a:t>"0x"</a:t>
+            </a:r>
+            <a:r>
+              <a:rPr lang="en-US" sz="1000" dirty="0">
+                <a:solidFill>
+                  <a:srgbClr val="000000"/>
+                </a:solidFill>
+                <a:latin typeface="Cascadia Mono" panose="020B0609020000020004" pitchFamily="49" charset="0"/>
+              </a:rPr>
+              <a:t>));</a:t>
+            </a:r>
+          </a:p>
+          <a:p>
+            <a:r>
+              <a:rPr lang="en-US" sz="1000" dirty="0">
+                <a:solidFill>
+                  <a:srgbClr val="000000"/>
+                </a:solidFill>
+                <a:latin typeface="Cascadia Mono" panose="020B0609020000020004" pitchFamily="49" charset="0"/>
+              </a:rPr>
+              <a:t>    </a:t>
+            </a:r>
+            <a:r>
+              <a:rPr lang="en-US" sz="1000" dirty="0" err="1">
+                <a:solidFill>
+                  <a:srgbClr val="000000"/>
+                </a:solidFill>
+                <a:latin typeface="Cascadia Mono" panose="020B0609020000020004" pitchFamily="49" charset="0"/>
+              </a:rPr>
+              <a:t>DEBUG_SERIAL.print</a:t>
+            </a:r>
+            <a:r>
+              <a:rPr lang="en-US" sz="1000" dirty="0">
+                <a:solidFill>
+                  <a:srgbClr val="000000"/>
+                </a:solidFill>
+                <a:latin typeface="Cascadia Mono" panose="020B0609020000020004" pitchFamily="49" charset="0"/>
+              </a:rPr>
+              <a:t>(</a:t>
+            </a:r>
+            <a:r>
+              <a:rPr lang="en-US" sz="1000" dirty="0" err="1">
+                <a:solidFill>
+                  <a:srgbClr val="000000"/>
+                </a:solidFill>
+                <a:latin typeface="Cascadia Mono" panose="020B0609020000020004" pitchFamily="49" charset="0"/>
+              </a:rPr>
+              <a:t>write_buffer</a:t>
+            </a:r>
+            <a:r>
+              <a:rPr lang="en-US" sz="1000" dirty="0">
+                <a:solidFill>
+                  <a:srgbClr val="000000"/>
+                </a:solidFill>
+                <a:latin typeface="Cascadia Mono" panose="020B0609020000020004" pitchFamily="49" charset="0"/>
+              </a:rPr>
+              <a:t>[</a:t>
+            </a:r>
+            <a:r>
+              <a:rPr lang="en-US" sz="1000" dirty="0" err="1">
+                <a:solidFill>
+                  <a:srgbClr val="000000"/>
+                </a:solidFill>
+                <a:latin typeface="Cascadia Mono" panose="020B0609020000020004" pitchFamily="49" charset="0"/>
+              </a:rPr>
+              <a:t>i</a:t>
+            </a:r>
+            <a:r>
+              <a:rPr lang="en-US" sz="1000" dirty="0">
+                <a:solidFill>
+                  <a:srgbClr val="000000"/>
+                </a:solidFill>
+                <a:latin typeface="Cascadia Mono" panose="020B0609020000020004" pitchFamily="49" charset="0"/>
+              </a:rPr>
+              <a:t>], HEX);</a:t>
+            </a:r>
+          </a:p>
+          <a:p>
+            <a:r>
+              <a:rPr lang="en-US" sz="1000" dirty="0">
+                <a:solidFill>
+                  <a:srgbClr val="000000"/>
+                </a:solidFill>
+                <a:latin typeface="Cascadia Mono" panose="020B0609020000020004" pitchFamily="49" charset="0"/>
+              </a:rPr>
+              <a:t>    </a:t>
+            </a:r>
+            <a:r>
+              <a:rPr lang="en-US" sz="1000" dirty="0" err="1">
+                <a:solidFill>
+                  <a:srgbClr val="000000"/>
+                </a:solidFill>
+                <a:latin typeface="Cascadia Mono" panose="020B0609020000020004" pitchFamily="49" charset="0"/>
+              </a:rPr>
+              <a:t>DEBUG_SERIAL.print</a:t>
+            </a:r>
+            <a:r>
+              <a:rPr lang="en-US" sz="1000" dirty="0">
+                <a:solidFill>
+                  <a:srgbClr val="000000"/>
+                </a:solidFill>
+                <a:latin typeface="Cascadia Mono" panose="020B0609020000020004" pitchFamily="49" charset="0"/>
+              </a:rPr>
+              <a:t>(F(</a:t>
+            </a:r>
+            <a:r>
+              <a:rPr lang="en-US" sz="1000" dirty="0">
+                <a:solidFill>
+                  <a:srgbClr val="A31515"/>
+                </a:solidFill>
+                <a:latin typeface="Cascadia Mono" panose="020B0609020000020004" pitchFamily="49" charset="0"/>
+              </a:rPr>
+              <a:t>", "</a:t>
+            </a:r>
+            <a:r>
+              <a:rPr lang="en-US" sz="1000" dirty="0">
+                <a:solidFill>
+                  <a:srgbClr val="000000"/>
+                </a:solidFill>
+                <a:latin typeface="Cascadia Mono" panose="020B0609020000020004" pitchFamily="49" charset="0"/>
+              </a:rPr>
+              <a:t>));</a:t>
+            </a:r>
+          </a:p>
+          <a:p>
+            <a:r>
+              <a:rPr lang="en-US" sz="1000" dirty="0">
+                <a:solidFill>
+                  <a:srgbClr val="000000"/>
+                </a:solidFill>
+                <a:latin typeface="Cascadia Mono" panose="020B0609020000020004" pitchFamily="49" charset="0"/>
+              </a:rPr>
+              <a:t>    </a:t>
+            </a:r>
+            <a:r>
+              <a:rPr lang="en-US" sz="1000" dirty="0">
+                <a:solidFill>
+                  <a:srgbClr val="0000FF"/>
+                </a:solidFill>
+                <a:latin typeface="Cascadia Mono" panose="020B0609020000020004" pitchFamily="49" charset="0"/>
+              </a:rPr>
+              <a:t>if</a:t>
+            </a:r>
+            <a:r>
+              <a:rPr lang="en-US" sz="1000" dirty="0">
+                <a:solidFill>
+                  <a:srgbClr val="000000"/>
+                </a:solidFill>
+                <a:latin typeface="Cascadia Mono" panose="020B0609020000020004" pitchFamily="49" charset="0"/>
+              </a:rPr>
+              <a:t> (</a:t>
+            </a:r>
+            <a:r>
+              <a:rPr lang="en-US" sz="1000" dirty="0" err="1">
+                <a:solidFill>
+                  <a:srgbClr val="000000"/>
+                </a:solidFill>
+                <a:latin typeface="Cascadia Mono" panose="020B0609020000020004" pitchFamily="49" charset="0"/>
+              </a:rPr>
+              <a:t>write_len</a:t>
+            </a:r>
+            <a:r>
+              <a:rPr lang="en-US" sz="1000" dirty="0">
+                <a:solidFill>
+                  <a:srgbClr val="000000"/>
+                </a:solidFill>
+                <a:latin typeface="Cascadia Mono" panose="020B0609020000020004" pitchFamily="49" charset="0"/>
+              </a:rPr>
+              <a:t> % 32 == 31) {</a:t>
+            </a:r>
+          </a:p>
+          <a:p>
+            <a:r>
+              <a:rPr lang="en-US" sz="1000" dirty="0">
+                <a:solidFill>
+                  <a:srgbClr val="000000"/>
+                </a:solidFill>
+                <a:latin typeface="Cascadia Mono" panose="020B0609020000020004" pitchFamily="49" charset="0"/>
+              </a:rPr>
+              <a:t>      </a:t>
+            </a:r>
+            <a:r>
+              <a:rPr lang="en-US" sz="1000" dirty="0" err="1">
+                <a:solidFill>
+                  <a:srgbClr val="000000"/>
+                </a:solidFill>
+                <a:latin typeface="Cascadia Mono" panose="020B0609020000020004" pitchFamily="49" charset="0"/>
+              </a:rPr>
+              <a:t>DEBUG_SERIAL.println</a:t>
+            </a:r>
+            <a:r>
+              <a:rPr lang="en-US" sz="1000" dirty="0">
+                <a:solidFill>
+                  <a:srgbClr val="000000"/>
+                </a:solidFill>
+                <a:latin typeface="Cascadia Mono" panose="020B0609020000020004" pitchFamily="49" charset="0"/>
+              </a:rPr>
+              <a:t>();</a:t>
+            </a:r>
+          </a:p>
+          <a:p>
+            <a:r>
+              <a:rPr lang="en-US" sz="1000" dirty="0">
+                <a:solidFill>
+                  <a:srgbClr val="000000"/>
+                </a:solidFill>
+                <a:latin typeface="Cascadia Mono" panose="020B0609020000020004" pitchFamily="49" charset="0"/>
+              </a:rPr>
+              <a:t>    }</a:t>
+            </a:r>
+          </a:p>
+          <a:p>
+            <a:r>
+              <a:rPr lang="en-US" sz="1000" dirty="0">
+                <a:solidFill>
+                  <a:srgbClr val="000000"/>
+                </a:solidFill>
+                <a:latin typeface="Cascadia Mono" panose="020B0609020000020004" pitchFamily="49" charset="0"/>
+              </a:rPr>
+              <a:t>  }</a:t>
+            </a:r>
+          </a:p>
+          <a:p>
+            <a:r>
+              <a:rPr lang="en-US" sz="1000" dirty="0">
+                <a:solidFill>
+                  <a:srgbClr val="000000"/>
+                </a:solidFill>
+                <a:latin typeface="Cascadia Mono" panose="020B0609020000020004" pitchFamily="49" charset="0"/>
+              </a:rPr>
+              <a:t>  </a:t>
+            </a:r>
+            <a:r>
+              <a:rPr lang="en-US" sz="1000" dirty="0" err="1">
+                <a:solidFill>
+                  <a:srgbClr val="000000"/>
+                </a:solidFill>
+                <a:latin typeface="Cascadia Mono" panose="020B0609020000020004" pitchFamily="49" charset="0"/>
+              </a:rPr>
+              <a:t>DEBUG_SERIAL.println</a:t>
+            </a:r>
+            <a:r>
+              <a:rPr lang="en-US" sz="1000" dirty="0">
+                <a:solidFill>
+                  <a:srgbClr val="000000"/>
+                </a:solidFill>
+                <a:latin typeface="Cascadia Mono" panose="020B0609020000020004" pitchFamily="49" charset="0"/>
+              </a:rPr>
+              <a:t>();</a:t>
+            </a:r>
+          </a:p>
+          <a:p>
+            <a:r>
+              <a:rPr lang="en-US" sz="1000" dirty="0">
+                <a:solidFill>
+                  <a:srgbClr val="808080"/>
+                </a:solidFill>
+                <a:latin typeface="Cascadia Mono" panose="020B0609020000020004" pitchFamily="49" charset="0"/>
+              </a:rPr>
+              <a:t>#endif</a:t>
+            </a:r>
+            <a:endParaRPr lang="en-US" sz="1000" dirty="0">
+              <a:solidFill>
+                <a:srgbClr val="000000"/>
+              </a:solidFill>
+              <a:latin typeface="Cascadia Mono" panose="020B0609020000020004" pitchFamily="49" charset="0"/>
+            </a:endParaRPr>
+          </a:p>
+          <a:p>
+            <a:endParaRPr lang="en-US" sz="1000" dirty="0">
+              <a:solidFill>
+                <a:srgbClr val="000000"/>
+              </a:solidFill>
+              <a:latin typeface="Cascadia Mono" panose="020B0609020000020004" pitchFamily="49" charset="0"/>
+            </a:endParaRPr>
+          </a:p>
+          <a:p>
+            <a:r>
+              <a:rPr lang="en-US" sz="1000" dirty="0">
+                <a:solidFill>
+                  <a:srgbClr val="000000"/>
+                </a:solidFill>
+                <a:latin typeface="Cascadia Mono" panose="020B0609020000020004" pitchFamily="49" charset="0"/>
+              </a:rPr>
+              <a:t>  </a:t>
+            </a:r>
+            <a:r>
+              <a:rPr lang="en-US" sz="1000" dirty="0">
+                <a:solidFill>
+                  <a:srgbClr val="008000"/>
+                </a:solidFill>
+                <a:latin typeface="Cascadia Mono" panose="020B0609020000020004" pitchFamily="49" charset="0"/>
+              </a:rPr>
+              <a:t>// do the reading</a:t>
+            </a:r>
+            <a:endParaRPr lang="en-US" sz="1000" dirty="0">
+              <a:solidFill>
+                <a:srgbClr val="000000"/>
+              </a:solidFill>
+              <a:latin typeface="Cascadia Mono" panose="020B0609020000020004" pitchFamily="49" charset="0"/>
+            </a:endParaRPr>
+          </a:p>
+          <a:p>
+            <a:r>
+              <a:rPr lang="nn-NO" sz="1000" dirty="0">
+                <a:solidFill>
+                  <a:srgbClr val="000000"/>
+                </a:solidFill>
+                <a:latin typeface="Cascadia Mono" panose="020B0609020000020004" pitchFamily="49" charset="0"/>
+              </a:rPr>
+              <a:t>  </a:t>
+            </a:r>
+            <a:r>
+              <a:rPr lang="nn-NO" sz="1000" dirty="0">
+                <a:solidFill>
+                  <a:srgbClr val="0000FF"/>
+                </a:solidFill>
+                <a:latin typeface="Cascadia Mono" panose="020B0609020000020004" pitchFamily="49" charset="0"/>
+              </a:rPr>
+              <a:t>for</a:t>
+            </a:r>
+            <a:r>
+              <a:rPr lang="nn-NO" sz="1000" dirty="0">
+                <a:solidFill>
+                  <a:srgbClr val="000000"/>
+                </a:solidFill>
+                <a:latin typeface="Cascadia Mono" panose="020B0609020000020004" pitchFamily="49" charset="0"/>
+              </a:rPr>
+              <a:t> (</a:t>
+            </a:r>
+            <a:r>
+              <a:rPr lang="nn-NO" sz="1000" dirty="0">
+                <a:solidFill>
+                  <a:srgbClr val="2B91AF"/>
+                </a:solidFill>
+                <a:latin typeface="Cascadia Mono" panose="020B0609020000020004" pitchFamily="49" charset="0"/>
+              </a:rPr>
+              <a:t>size_t</a:t>
+            </a:r>
+            <a:r>
+              <a:rPr lang="nn-NO" sz="1000" dirty="0">
+                <a:solidFill>
+                  <a:srgbClr val="000000"/>
+                </a:solidFill>
+                <a:latin typeface="Cascadia Mono" panose="020B0609020000020004" pitchFamily="49" charset="0"/>
+              </a:rPr>
+              <a:t> i = 0; i &lt; </a:t>
+            </a:r>
+            <a:r>
+              <a:rPr lang="nn-NO" sz="1000" dirty="0">
+                <a:solidFill>
+                  <a:srgbClr val="808080"/>
+                </a:solidFill>
+                <a:latin typeface="Cascadia Mono" panose="020B0609020000020004" pitchFamily="49" charset="0"/>
+              </a:rPr>
+              <a:t>read_len</a:t>
+            </a:r>
+            <a:r>
+              <a:rPr lang="nn-NO" sz="1000" dirty="0">
+                <a:solidFill>
+                  <a:srgbClr val="000000"/>
+                </a:solidFill>
+                <a:latin typeface="Cascadia Mono" panose="020B0609020000020004" pitchFamily="49" charset="0"/>
+              </a:rPr>
+              <a:t>; i++) {</a:t>
+            </a:r>
+          </a:p>
+          <a:p>
+            <a:r>
+              <a:rPr lang="en-US" sz="1000" dirty="0">
+                <a:solidFill>
+                  <a:srgbClr val="000000"/>
+                </a:solidFill>
+                <a:latin typeface="Cascadia Mono" panose="020B0609020000020004" pitchFamily="49" charset="0"/>
+              </a:rPr>
+              <a:t>    </a:t>
+            </a:r>
+            <a:r>
+              <a:rPr lang="en-US" sz="1000" dirty="0" err="1">
+                <a:solidFill>
+                  <a:srgbClr val="808080"/>
+                </a:solidFill>
+                <a:latin typeface="Cascadia Mono" panose="020B0609020000020004" pitchFamily="49" charset="0"/>
+              </a:rPr>
+              <a:t>read_buffer</a:t>
+            </a:r>
+            <a:r>
+              <a:rPr lang="en-US" sz="1000" dirty="0">
+                <a:solidFill>
+                  <a:srgbClr val="000000"/>
+                </a:solidFill>
+                <a:latin typeface="Cascadia Mono" panose="020B0609020000020004" pitchFamily="49" charset="0"/>
+              </a:rPr>
+              <a:t>[</a:t>
+            </a:r>
+            <a:r>
+              <a:rPr lang="en-US" sz="1000" dirty="0" err="1">
+                <a:solidFill>
+                  <a:srgbClr val="000000"/>
+                </a:solidFill>
+                <a:latin typeface="Cascadia Mono" panose="020B0609020000020004" pitchFamily="49" charset="0"/>
+              </a:rPr>
+              <a:t>i</a:t>
+            </a:r>
+            <a:r>
+              <a:rPr lang="en-US" sz="1000" dirty="0">
+                <a:solidFill>
+                  <a:srgbClr val="000000"/>
+                </a:solidFill>
+                <a:latin typeface="Cascadia Mono" panose="020B0609020000020004" pitchFamily="49" charset="0"/>
+              </a:rPr>
+              <a:t>] = transfer(</a:t>
+            </a:r>
+            <a:r>
+              <a:rPr lang="en-US" sz="1000" dirty="0" err="1">
+                <a:solidFill>
+                  <a:srgbClr val="808080"/>
+                </a:solidFill>
+                <a:latin typeface="Cascadia Mono" panose="020B0609020000020004" pitchFamily="49" charset="0"/>
+              </a:rPr>
+              <a:t>sendvalue</a:t>
+            </a:r>
+            <a:r>
+              <a:rPr lang="en-US" sz="1000" dirty="0">
+                <a:solidFill>
+                  <a:srgbClr val="000000"/>
+                </a:solidFill>
+                <a:latin typeface="Cascadia Mono" panose="020B0609020000020004" pitchFamily="49" charset="0"/>
+              </a:rPr>
+              <a:t>);</a:t>
+            </a:r>
+          </a:p>
+          <a:p>
+            <a:r>
+              <a:rPr lang="en-US" sz="1000" dirty="0">
+                <a:solidFill>
+                  <a:srgbClr val="000000"/>
+                </a:solidFill>
+                <a:latin typeface="Cascadia Mono" panose="020B0609020000020004" pitchFamily="49" charset="0"/>
+              </a:rPr>
+              <a:t>  }</a:t>
+            </a:r>
+          </a:p>
+          <a:p>
+            <a:endParaRPr lang="en-US" sz="1000" dirty="0">
+              <a:solidFill>
+                <a:srgbClr val="000000"/>
+              </a:solidFill>
+              <a:latin typeface="Cascadia Mono" panose="020B0609020000020004" pitchFamily="49" charset="0"/>
+            </a:endParaRPr>
+          </a:p>
+          <a:p>
+            <a:r>
+              <a:rPr lang="en-US" sz="1000" dirty="0">
+                <a:solidFill>
+                  <a:srgbClr val="808080"/>
+                </a:solidFill>
+                <a:latin typeface="Cascadia Mono" panose="020B0609020000020004" pitchFamily="49" charset="0"/>
+              </a:rPr>
+              <a:t>#ifdef</a:t>
+            </a:r>
+            <a:r>
+              <a:rPr lang="en-US" sz="1000" dirty="0">
+                <a:solidFill>
+                  <a:srgbClr val="000000"/>
+                </a:solidFill>
+                <a:latin typeface="Cascadia Mono" panose="020B0609020000020004" pitchFamily="49" charset="0"/>
+              </a:rPr>
+              <a:t> DEBUG_SERIAL</a:t>
+            </a:r>
+          </a:p>
+          <a:p>
+            <a:r>
+              <a:rPr lang="en-US" sz="1000" dirty="0">
+                <a:solidFill>
+                  <a:srgbClr val="000000"/>
+                </a:solidFill>
+                <a:latin typeface="Cascadia Mono" panose="020B0609020000020004" pitchFamily="49" charset="0"/>
+              </a:rPr>
+              <a:t>  </a:t>
+            </a:r>
+            <a:r>
+              <a:rPr lang="en-US" sz="1000" dirty="0" err="1">
+                <a:solidFill>
+                  <a:srgbClr val="000000"/>
+                </a:solidFill>
+                <a:latin typeface="Cascadia Mono" panose="020B0609020000020004" pitchFamily="49" charset="0"/>
+              </a:rPr>
+              <a:t>DEBUG_SERIAL.print</a:t>
+            </a:r>
+            <a:r>
+              <a:rPr lang="en-US" sz="1000" dirty="0">
+                <a:solidFill>
+                  <a:srgbClr val="000000"/>
+                </a:solidFill>
+                <a:latin typeface="Cascadia Mono" panose="020B0609020000020004" pitchFamily="49" charset="0"/>
+              </a:rPr>
+              <a:t>(F(</a:t>
+            </a:r>
+            <a:r>
+              <a:rPr lang="en-US" sz="1000" dirty="0">
+                <a:solidFill>
+                  <a:srgbClr val="A31515"/>
+                </a:solidFill>
+                <a:latin typeface="Cascadia Mono" panose="020B0609020000020004" pitchFamily="49" charset="0"/>
+              </a:rPr>
+              <a:t>"\</a:t>
+            </a:r>
+            <a:r>
+              <a:rPr lang="en-US" sz="1000" dirty="0" err="1">
+                <a:solidFill>
+                  <a:srgbClr val="A31515"/>
+                </a:solidFill>
+                <a:latin typeface="Cascadia Mono" panose="020B0609020000020004" pitchFamily="49" charset="0"/>
+              </a:rPr>
+              <a:t>tSPIDevice</a:t>
+            </a:r>
+            <a:r>
+              <a:rPr lang="en-US" sz="1000" dirty="0">
+                <a:solidFill>
+                  <a:srgbClr val="A31515"/>
+                </a:solidFill>
+                <a:latin typeface="Cascadia Mono" panose="020B0609020000020004" pitchFamily="49" charset="0"/>
+              </a:rPr>
+              <a:t> Read: "</a:t>
+            </a:r>
+            <a:r>
+              <a:rPr lang="en-US" sz="1000" dirty="0">
+                <a:solidFill>
+                  <a:srgbClr val="000000"/>
+                </a:solidFill>
+                <a:latin typeface="Cascadia Mono" panose="020B0609020000020004" pitchFamily="49" charset="0"/>
+              </a:rPr>
+              <a:t>));</a:t>
+            </a:r>
+          </a:p>
+          <a:p>
+            <a:r>
+              <a:rPr lang="nn-NO" sz="1000" dirty="0">
+                <a:solidFill>
+                  <a:srgbClr val="000000"/>
+                </a:solidFill>
+                <a:latin typeface="Cascadia Mono" panose="020B0609020000020004" pitchFamily="49" charset="0"/>
+              </a:rPr>
+              <a:t>  </a:t>
+            </a:r>
+            <a:r>
+              <a:rPr lang="nn-NO" sz="1000" dirty="0">
+                <a:solidFill>
+                  <a:srgbClr val="0000FF"/>
+                </a:solidFill>
+                <a:latin typeface="Cascadia Mono" panose="020B0609020000020004" pitchFamily="49" charset="0"/>
+              </a:rPr>
+              <a:t>for</a:t>
+            </a:r>
+            <a:r>
+              <a:rPr lang="nn-NO" sz="1000" dirty="0">
+                <a:solidFill>
+                  <a:srgbClr val="000000"/>
+                </a:solidFill>
+                <a:latin typeface="Cascadia Mono" panose="020B0609020000020004" pitchFamily="49" charset="0"/>
+              </a:rPr>
+              <a:t> (uint16_t i = 0; i &lt; read_len; i++) {</a:t>
+            </a:r>
+          </a:p>
+          <a:p>
+            <a:r>
+              <a:rPr lang="en-US" sz="1000" dirty="0">
+                <a:solidFill>
+                  <a:srgbClr val="000000"/>
+                </a:solidFill>
+                <a:latin typeface="Cascadia Mono" panose="020B0609020000020004" pitchFamily="49" charset="0"/>
+              </a:rPr>
+              <a:t>    </a:t>
+            </a:r>
+            <a:r>
+              <a:rPr lang="en-US" sz="1000" dirty="0" err="1">
+                <a:solidFill>
+                  <a:srgbClr val="000000"/>
+                </a:solidFill>
+                <a:latin typeface="Cascadia Mono" panose="020B0609020000020004" pitchFamily="49" charset="0"/>
+              </a:rPr>
+              <a:t>DEBUG_SERIAL.print</a:t>
+            </a:r>
+            <a:r>
+              <a:rPr lang="en-US" sz="1000" dirty="0">
+                <a:solidFill>
+                  <a:srgbClr val="000000"/>
+                </a:solidFill>
+                <a:latin typeface="Cascadia Mono" panose="020B0609020000020004" pitchFamily="49" charset="0"/>
+              </a:rPr>
+              <a:t>(F(</a:t>
+            </a:r>
+            <a:r>
+              <a:rPr lang="en-US" sz="1000" dirty="0">
+                <a:solidFill>
+                  <a:srgbClr val="A31515"/>
+                </a:solidFill>
+                <a:latin typeface="Cascadia Mono" panose="020B0609020000020004" pitchFamily="49" charset="0"/>
+              </a:rPr>
+              <a:t>"0x"</a:t>
+            </a:r>
+            <a:r>
+              <a:rPr lang="en-US" sz="1000" dirty="0">
+                <a:solidFill>
+                  <a:srgbClr val="000000"/>
+                </a:solidFill>
+                <a:latin typeface="Cascadia Mono" panose="020B0609020000020004" pitchFamily="49" charset="0"/>
+              </a:rPr>
+              <a:t>));</a:t>
+            </a:r>
+          </a:p>
+          <a:p>
+            <a:r>
+              <a:rPr lang="en-US" sz="1000" dirty="0">
+                <a:solidFill>
+                  <a:srgbClr val="000000"/>
+                </a:solidFill>
+                <a:latin typeface="Cascadia Mono" panose="020B0609020000020004" pitchFamily="49" charset="0"/>
+              </a:rPr>
+              <a:t>    </a:t>
+            </a:r>
+            <a:r>
+              <a:rPr lang="en-US" sz="1000" dirty="0" err="1">
+                <a:solidFill>
+                  <a:srgbClr val="000000"/>
+                </a:solidFill>
+                <a:latin typeface="Cascadia Mono" panose="020B0609020000020004" pitchFamily="49" charset="0"/>
+              </a:rPr>
+              <a:t>DEBUG_SERIAL.print</a:t>
+            </a:r>
+            <a:r>
+              <a:rPr lang="en-US" sz="1000" dirty="0">
+                <a:solidFill>
+                  <a:srgbClr val="000000"/>
+                </a:solidFill>
+                <a:latin typeface="Cascadia Mono" panose="020B0609020000020004" pitchFamily="49" charset="0"/>
+              </a:rPr>
+              <a:t>(</a:t>
+            </a:r>
+            <a:r>
+              <a:rPr lang="en-US" sz="1000" dirty="0" err="1">
+                <a:solidFill>
+                  <a:srgbClr val="000000"/>
+                </a:solidFill>
+                <a:latin typeface="Cascadia Mono" panose="020B0609020000020004" pitchFamily="49" charset="0"/>
+              </a:rPr>
+              <a:t>read_buffer</a:t>
+            </a:r>
+            <a:r>
+              <a:rPr lang="en-US" sz="1000" dirty="0">
+                <a:solidFill>
+                  <a:srgbClr val="000000"/>
+                </a:solidFill>
+                <a:latin typeface="Cascadia Mono" panose="020B0609020000020004" pitchFamily="49" charset="0"/>
+              </a:rPr>
+              <a:t>[</a:t>
+            </a:r>
+            <a:r>
+              <a:rPr lang="en-US" sz="1000" dirty="0" err="1">
+                <a:solidFill>
+                  <a:srgbClr val="000000"/>
+                </a:solidFill>
+                <a:latin typeface="Cascadia Mono" panose="020B0609020000020004" pitchFamily="49" charset="0"/>
+              </a:rPr>
+              <a:t>i</a:t>
+            </a:r>
+            <a:r>
+              <a:rPr lang="en-US" sz="1000" dirty="0">
+                <a:solidFill>
+                  <a:srgbClr val="000000"/>
+                </a:solidFill>
+                <a:latin typeface="Cascadia Mono" panose="020B0609020000020004" pitchFamily="49" charset="0"/>
+              </a:rPr>
+              <a:t>], HEX);</a:t>
+            </a:r>
+          </a:p>
+          <a:p>
+            <a:r>
+              <a:rPr lang="en-US" sz="1000" dirty="0">
+                <a:solidFill>
+                  <a:srgbClr val="000000"/>
+                </a:solidFill>
+                <a:latin typeface="Cascadia Mono" panose="020B0609020000020004" pitchFamily="49" charset="0"/>
+              </a:rPr>
+              <a:t>    </a:t>
+            </a:r>
+            <a:r>
+              <a:rPr lang="en-US" sz="1000" dirty="0" err="1">
+                <a:solidFill>
+                  <a:srgbClr val="000000"/>
+                </a:solidFill>
+                <a:latin typeface="Cascadia Mono" panose="020B0609020000020004" pitchFamily="49" charset="0"/>
+              </a:rPr>
+              <a:t>DEBUG_SERIAL.print</a:t>
+            </a:r>
+            <a:r>
+              <a:rPr lang="en-US" sz="1000" dirty="0">
+                <a:solidFill>
+                  <a:srgbClr val="000000"/>
+                </a:solidFill>
+                <a:latin typeface="Cascadia Mono" panose="020B0609020000020004" pitchFamily="49" charset="0"/>
+              </a:rPr>
+              <a:t>(F(</a:t>
+            </a:r>
+            <a:r>
+              <a:rPr lang="en-US" sz="1000" dirty="0">
+                <a:solidFill>
+                  <a:srgbClr val="A31515"/>
+                </a:solidFill>
+                <a:latin typeface="Cascadia Mono" panose="020B0609020000020004" pitchFamily="49" charset="0"/>
+              </a:rPr>
+              <a:t>", "</a:t>
+            </a:r>
+            <a:r>
+              <a:rPr lang="en-US" sz="1000" dirty="0">
+                <a:solidFill>
+                  <a:srgbClr val="000000"/>
+                </a:solidFill>
+                <a:latin typeface="Cascadia Mono" panose="020B0609020000020004" pitchFamily="49" charset="0"/>
+              </a:rPr>
+              <a:t>));</a:t>
+            </a:r>
+          </a:p>
+          <a:p>
+            <a:r>
+              <a:rPr lang="en-US" sz="1000" dirty="0">
+                <a:solidFill>
+                  <a:srgbClr val="000000"/>
+                </a:solidFill>
+                <a:latin typeface="Cascadia Mono" panose="020B0609020000020004" pitchFamily="49" charset="0"/>
+              </a:rPr>
+              <a:t>    </a:t>
+            </a:r>
+            <a:r>
+              <a:rPr lang="en-US" sz="1000" dirty="0">
+                <a:solidFill>
+                  <a:srgbClr val="0000FF"/>
+                </a:solidFill>
+                <a:latin typeface="Cascadia Mono" panose="020B0609020000020004" pitchFamily="49" charset="0"/>
+              </a:rPr>
+              <a:t>if</a:t>
+            </a:r>
+            <a:r>
+              <a:rPr lang="en-US" sz="1000" dirty="0">
+                <a:solidFill>
+                  <a:srgbClr val="000000"/>
+                </a:solidFill>
+                <a:latin typeface="Cascadia Mono" panose="020B0609020000020004" pitchFamily="49" charset="0"/>
+              </a:rPr>
+              <a:t> (</a:t>
+            </a:r>
+            <a:r>
+              <a:rPr lang="en-US" sz="1000" dirty="0" err="1">
+                <a:solidFill>
+                  <a:srgbClr val="000000"/>
+                </a:solidFill>
+                <a:latin typeface="Cascadia Mono" panose="020B0609020000020004" pitchFamily="49" charset="0"/>
+              </a:rPr>
+              <a:t>read_len</a:t>
+            </a:r>
+            <a:r>
+              <a:rPr lang="en-US" sz="1000" dirty="0">
+                <a:solidFill>
+                  <a:srgbClr val="000000"/>
+                </a:solidFill>
+                <a:latin typeface="Cascadia Mono" panose="020B0609020000020004" pitchFamily="49" charset="0"/>
+              </a:rPr>
+              <a:t> % 32 == 31) {</a:t>
+            </a:r>
+          </a:p>
+          <a:p>
+            <a:r>
+              <a:rPr lang="en-US" sz="1000" dirty="0">
+                <a:solidFill>
+                  <a:srgbClr val="000000"/>
+                </a:solidFill>
+                <a:latin typeface="Cascadia Mono" panose="020B0609020000020004" pitchFamily="49" charset="0"/>
+              </a:rPr>
+              <a:t>      </a:t>
+            </a:r>
+            <a:r>
+              <a:rPr lang="en-US" sz="1000" dirty="0" err="1">
+                <a:solidFill>
+                  <a:srgbClr val="000000"/>
+                </a:solidFill>
+                <a:latin typeface="Cascadia Mono" panose="020B0609020000020004" pitchFamily="49" charset="0"/>
+              </a:rPr>
+              <a:t>DEBUG_SERIAL.println</a:t>
+            </a:r>
+            <a:r>
+              <a:rPr lang="en-US" sz="1000" dirty="0">
+                <a:solidFill>
+                  <a:srgbClr val="000000"/>
+                </a:solidFill>
+                <a:latin typeface="Cascadia Mono" panose="020B0609020000020004" pitchFamily="49" charset="0"/>
+              </a:rPr>
+              <a:t>();</a:t>
+            </a:r>
+          </a:p>
+          <a:p>
+            <a:r>
+              <a:rPr lang="en-US" sz="1000" dirty="0">
+                <a:solidFill>
+                  <a:srgbClr val="000000"/>
+                </a:solidFill>
+                <a:latin typeface="Cascadia Mono" panose="020B0609020000020004" pitchFamily="49" charset="0"/>
+              </a:rPr>
+              <a:t>    }</a:t>
+            </a:r>
+          </a:p>
+          <a:p>
+            <a:r>
+              <a:rPr lang="en-US" sz="1000" dirty="0">
+                <a:solidFill>
+                  <a:srgbClr val="000000"/>
+                </a:solidFill>
+                <a:latin typeface="Cascadia Mono" panose="020B0609020000020004" pitchFamily="49" charset="0"/>
+              </a:rPr>
+              <a:t>  }</a:t>
+            </a:r>
+          </a:p>
+          <a:p>
+            <a:r>
+              <a:rPr lang="en-US" sz="1000" dirty="0">
+                <a:solidFill>
+                  <a:srgbClr val="000000"/>
+                </a:solidFill>
+                <a:latin typeface="Cascadia Mono" panose="020B0609020000020004" pitchFamily="49" charset="0"/>
+              </a:rPr>
+              <a:t>  </a:t>
+            </a:r>
+            <a:r>
+              <a:rPr lang="en-US" sz="1000" dirty="0" err="1">
+                <a:solidFill>
+                  <a:srgbClr val="000000"/>
+                </a:solidFill>
+                <a:latin typeface="Cascadia Mono" panose="020B0609020000020004" pitchFamily="49" charset="0"/>
+              </a:rPr>
+              <a:t>DEBUG_SERIAL.println</a:t>
+            </a:r>
+            <a:r>
+              <a:rPr lang="en-US" sz="1000" dirty="0">
+                <a:solidFill>
+                  <a:srgbClr val="000000"/>
+                </a:solidFill>
+                <a:latin typeface="Cascadia Mono" panose="020B0609020000020004" pitchFamily="49" charset="0"/>
+              </a:rPr>
+              <a:t>();</a:t>
+            </a:r>
+          </a:p>
+          <a:p>
+            <a:r>
+              <a:rPr lang="en-US" sz="1000" dirty="0">
+                <a:solidFill>
+                  <a:srgbClr val="808080"/>
+                </a:solidFill>
+                <a:latin typeface="Cascadia Mono" panose="020B0609020000020004" pitchFamily="49" charset="0"/>
+              </a:rPr>
+              <a:t>#endif</a:t>
+            </a:r>
+            <a:endParaRPr lang="en-US" sz="1000" dirty="0">
+              <a:solidFill>
+                <a:srgbClr val="000000"/>
+              </a:solidFill>
+              <a:latin typeface="Cascadia Mono" panose="020B0609020000020004" pitchFamily="49" charset="0"/>
+            </a:endParaRPr>
+          </a:p>
+          <a:p>
+            <a:endParaRPr lang="en-US" sz="1000" dirty="0">
+              <a:solidFill>
+                <a:srgbClr val="000000"/>
+              </a:solidFill>
+              <a:latin typeface="Cascadia Mono" panose="020B0609020000020004" pitchFamily="49" charset="0"/>
+            </a:endParaRPr>
+          </a:p>
+          <a:p>
+            <a:r>
+              <a:rPr lang="en-US" sz="1000" dirty="0">
+                <a:solidFill>
+                  <a:srgbClr val="000000"/>
+                </a:solidFill>
+                <a:latin typeface="Cascadia Mono" panose="020B0609020000020004" pitchFamily="49" charset="0"/>
+              </a:rPr>
+              <a:t>  </a:t>
+            </a:r>
+            <a:r>
+              <a:rPr lang="en-US" sz="1000" dirty="0" err="1">
+                <a:solidFill>
+                  <a:srgbClr val="000000"/>
+                </a:solidFill>
+                <a:latin typeface="Cascadia Mono" panose="020B0609020000020004" pitchFamily="49" charset="0"/>
+              </a:rPr>
+              <a:t>digitalWrite</a:t>
+            </a:r>
+            <a:r>
+              <a:rPr lang="en-US" sz="1000" dirty="0">
+                <a:solidFill>
+                  <a:srgbClr val="000000"/>
+                </a:solidFill>
+                <a:latin typeface="Cascadia Mono" panose="020B0609020000020004" pitchFamily="49" charset="0"/>
+              </a:rPr>
+              <a:t>(_cs, HIGH);</a:t>
+            </a:r>
+          </a:p>
+          <a:p>
+            <a:endParaRPr lang="en-US" sz="1000" dirty="0">
+              <a:solidFill>
+                <a:srgbClr val="000000"/>
+              </a:solidFill>
+              <a:latin typeface="Cascadia Mono" panose="020B0609020000020004" pitchFamily="49" charset="0"/>
+            </a:endParaRPr>
+          </a:p>
+          <a:p>
+            <a:r>
+              <a:rPr lang="en-US" sz="1000" dirty="0">
+                <a:solidFill>
+                  <a:srgbClr val="000000"/>
+                </a:solidFill>
+                <a:latin typeface="Cascadia Mono" panose="020B0609020000020004" pitchFamily="49" charset="0"/>
+              </a:rPr>
+              <a:t>  </a:t>
+            </a:r>
+            <a:r>
+              <a:rPr lang="en-US" sz="1000" dirty="0">
+                <a:solidFill>
+                  <a:srgbClr val="0000FF"/>
+                </a:solidFill>
+                <a:latin typeface="Cascadia Mono" panose="020B0609020000020004" pitchFamily="49" charset="0"/>
+              </a:rPr>
+              <a:t>if</a:t>
+            </a:r>
+            <a:r>
+              <a:rPr lang="en-US" sz="1000" dirty="0">
+                <a:solidFill>
+                  <a:srgbClr val="000000"/>
+                </a:solidFill>
+                <a:latin typeface="Cascadia Mono" panose="020B0609020000020004" pitchFamily="49" charset="0"/>
+              </a:rPr>
+              <a:t> (_</a:t>
+            </a:r>
+            <a:r>
+              <a:rPr lang="en-US" sz="1000" dirty="0" err="1">
+                <a:solidFill>
+                  <a:srgbClr val="000000"/>
+                </a:solidFill>
+                <a:latin typeface="Cascadia Mono" panose="020B0609020000020004" pitchFamily="49" charset="0"/>
+              </a:rPr>
+              <a:t>spi</a:t>
+            </a:r>
+            <a:r>
+              <a:rPr lang="en-US" sz="1000" dirty="0">
+                <a:solidFill>
+                  <a:srgbClr val="000000"/>
+                </a:solidFill>
+                <a:latin typeface="Cascadia Mono" panose="020B0609020000020004" pitchFamily="49" charset="0"/>
+              </a:rPr>
+              <a:t>) {</a:t>
+            </a:r>
+          </a:p>
+          <a:p>
+            <a:r>
+              <a:rPr lang="en-US" sz="1000" dirty="0">
+                <a:solidFill>
+                  <a:srgbClr val="000000"/>
+                </a:solidFill>
+                <a:latin typeface="Cascadia Mono" panose="020B0609020000020004" pitchFamily="49" charset="0"/>
+              </a:rPr>
+              <a:t>    _</a:t>
+            </a:r>
+            <a:r>
+              <a:rPr lang="en-US" sz="1000" dirty="0" err="1">
+                <a:solidFill>
+                  <a:srgbClr val="000000"/>
+                </a:solidFill>
+                <a:latin typeface="Cascadia Mono" panose="020B0609020000020004" pitchFamily="49" charset="0"/>
+              </a:rPr>
+              <a:t>spi</a:t>
+            </a:r>
+            <a:r>
+              <a:rPr lang="en-US" sz="1000" dirty="0">
+                <a:solidFill>
+                  <a:srgbClr val="000000"/>
+                </a:solidFill>
+                <a:latin typeface="Cascadia Mono" panose="020B0609020000020004" pitchFamily="49" charset="0"/>
+              </a:rPr>
+              <a:t>-&gt;</a:t>
+            </a:r>
+            <a:r>
+              <a:rPr lang="en-US" sz="1000" dirty="0" err="1">
+                <a:solidFill>
+                  <a:srgbClr val="000000"/>
+                </a:solidFill>
+                <a:latin typeface="Cascadia Mono" panose="020B0609020000020004" pitchFamily="49" charset="0"/>
+              </a:rPr>
+              <a:t>endTransaction</a:t>
+            </a:r>
+            <a:r>
+              <a:rPr lang="en-US" sz="1000" dirty="0">
+                <a:solidFill>
+                  <a:srgbClr val="000000"/>
+                </a:solidFill>
+                <a:latin typeface="Cascadia Mono" panose="020B0609020000020004" pitchFamily="49" charset="0"/>
+              </a:rPr>
+              <a:t>();</a:t>
+            </a:r>
+          </a:p>
+          <a:p>
+            <a:r>
+              <a:rPr lang="en-US" sz="1000" dirty="0">
+                <a:solidFill>
+                  <a:srgbClr val="000000"/>
+                </a:solidFill>
+                <a:latin typeface="Cascadia Mono" panose="020B0609020000020004" pitchFamily="49" charset="0"/>
+              </a:rPr>
+              <a:t>  }</a:t>
+            </a:r>
+          </a:p>
+          <a:p>
+            <a:endParaRPr lang="en-US" sz="1000" dirty="0">
+              <a:solidFill>
+                <a:srgbClr val="000000"/>
+              </a:solidFill>
+              <a:latin typeface="Cascadia Mono" panose="020B0609020000020004" pitchFamily="49" charset="0"/>
+            </a:endParaRPr>
+          </a:p>
+          <a:p>
+            <a:r>
+              <a:rPr lang="en-US" sz="1000" dirty="0">
+                <a:solidFill>
+                  <a:srgbClr val="000000"/>
+                </a:solidFill>
+                <a:latin typeface="Cascadia Mono" panose="020B0609020000020004" pitchFamily="49" charset="0"/>
+              </a:rPr>
+              <a:t>  </a:t>
+            </a:r>
+            <a:r>
+              <a:rPr lang="en-US" sz="1000" dirty="0">
+                <a:solidFill>
+                  <a:srgbClr val="0000FF"/>
+                </a:solidFill>
+                <a:latin typeface="Cascadia Mono" panose="020B0609020000020004" pitchFamily="49" charset="0"/>
+              </a:rPr>
+              <a:t>return</a:t>
+            </a:r>
+            <a:r>
+              <a:rPr lang="en-US" sz="1000" dirty="0">
+                <a:solidFill>
+                  <a:srgbClr val="000000"/>
+                </a:solidFill>
+                <a:latin typeface="Cascadia Mono" panose="020B0609020000020004" pitchFamily="49" charset="0"/>
+              </a:rPr>
+              <a:t> </a:t>
+            </a:r>
+            <a:r>
+              <a:rPr lang="en-US" sz="1000" dirty="0">
+                <a:solidFill>
+                  <a:srgbClr val="0000FF"/>
+                </a:solidFill>
+                <a:latin typeface="Cascadia Mono" panose="020B0609020000020004" pitchFamily="49" charset="0"/>
+              </a:rPr>
+              <a:t>true</a:t>
+            </a:r>
+            <a:r>
+              <a:rPr lang="en-US" sz="1000" dirty="0">
+                <a:solidFill>
+                  <a:srgbClr val="000000"/>
+                </a:solidFill>
+                <a:latin typeface="Cascadia Mono" panose="020B0609020000020004" pitchFamily="49" charset="0"/>
+              </a:rPr>
+              <a:t>;</a:t>
+            </a:r>
+          </a:p>
+          <a:p>
+            <a:r>
+              <a:rPr lang="en-US" sz="1000" dirty="0">
+                <a:solidFill>
+                  <a:srgbClr val="000000"/>
+                </a:solidFill>
+                <a:latin typeface="Cascadia Mono" panose="020B0609020000020004" pitchFamily="49" charset="0"/>
+              </a:rPr>
+              <a:t>}</a:t>
+            </a:r>
+            <a:endParaRPr lang="en-US" sz="1000" dirty="0"/>
+          </a:p>
+        </p:txBody>
+      </p:sp>
+      <p:sp>
+        <p:nvSpPr>
+          <p:cNvPr id="21" name="Freeform: Shape 20">
+            <a:extLst>
+              <a:ext uri="{FF2B5EF4-FFF2-40B4-BE49-F238E27FC236}">
+                <a16:creationId xmlns:a16="http://schemas.microsoft.com/office/drawing/2014/main" id="{06061632-F29A-06FE-A9F3-A327047700ED}"/>
+              </a:ext>
+            </a:extLst>
+          </p:cNvPr>
+          <p:cNvSpPr/>
+          <p:nvPr/>
+        </p:nvSpPr>
+        <p:spPr>
+          <a:xfrm>
+            <a:off x="5179568" y="5030355"/>
+            <a:ext cx="600635" cy="2170545"/>
+          </a:xfrm>
+          <a:custGeom>
+            <a:avLst/>
+            <a:gdLst>
+              <a:gd name="connsiteX0" fmla="*/ 0 w 600635"/>
+              <a:gd name="connsiteY0" fmla="*/ 0 h 493059"/>
+              <a:gd name="connsiteX1" fmla="*/ 0 w 600635"/>
+              <a:gd name="connsiteY1" fmla="*/ 493059 h 493059"/>
+              <a:gd name="connsiteX2" fmla="*/ 600635 w 600635"/>
+              <a:gd name="connsiteY2" fmla="*/ 493059 h 493059"/>
+            </a:gdLst>
+            <a:ahLst/>
+            <a:cxnLst>
+              <a:cxn ang="0">
+                <a:pos x="connsiteX0" y="connsiteY0"/>
+              </a:cxn>
+              <a:cxn ang="0">
+                <a:pos x="connsiteX1" y="connsiteY1"/>
+              </a:cxn>
+              <a:cxn ang="0">
+                <a:pos x="connsiteX2" y="connsiteY2"/>
+              </a:cxn>
+            </a:cxnLst>
+            <a:rect l="l" t="t" r="r" b="b"/>
+            <a:pathLst>
+              <a:path w="600635" h="493059">
+                <a:moveTo>
+                  <a:pt x="0" y="0"/>
+                </a:moveTo>
+                <a:lnTo>
+                  <a:pt x="0" y="493059"/>
+                </a:lnTo>
+                <a:lnTo>
+                  <a:pt x="600635" y="493059"/>
+                </a:lnTo>
+              </a:path>
+            </a:pathLst>
+          </a:custGeom>
+          <a:noFill/>
+          <a:ln>
+            <a:solidFill>
+              <a:srgbClr val="FF0000"/>
+            </a:solidFill>
+            <a:headEnd type="none" w="med" len="med"/>
+            <a:tailEnd type="triangle" w="med" len="med"/>
+          </a:ln>
+        </p:spPr>
+        <p:style>
+          <a:lnRef idx="2">
+            <a:schemeClr val="accent1">
+              <a:shade val="15000"/>
+            </a:schemeClr>
+          </a:lnRef>
+          <a:fillRef idx="1">
+            <a:schemeClr val="accent1"/>
+          </a:fillRef>
+          <a:effectRef idx="0">
+            <a:schemeClr val="accent1"/>
+          </a:effectRef>
+          <a:fontRef idx="minor">
+            <a:schemeClr val="lt1"/>
+          </a:fontRef>
+        </p:style>
+        <p:txBody>
+          <a:bodyPr rtlCol="0" anchor="ctr"/>
+          <a:lstStyle/>
+          <a:p>
+            <a:pPr algn="ctr"/>
+            <a:endParaRPr lang="en-US"/>
+          </a:p>
+        </p:txBody>
+      </p:sp>
+      <p:sp>
+        <p:nvSpPr>
+          <p:cNvPr id="23" name="TextBox 22">
+            <a:extLst>
+              <a:ext uri="{FF2B5EF4-FFF2-40B4-BE49-F238E27FC236}">
+                <a16:creationId xmlns:a16="http://schemas.microsoft.com/office/drawing/2014/main" id="{9350F174-4AD8-D489-C1BF-080FCCFBB906}"/>
+              </a:ext>
+            </a:extLst>
+          </p:cNvPr>
+          <p:cNvSpPr txBox="1"/>
+          <p:nvPr/>
+        </p:nvSpPr>
+        <p:spPr>
+          <a:xfrm>
+            <a:off x="12547600" y="7200900"/>
+            <a:ext cx="7387770" cy="553998"/>
+          </a:xfrm>
+          <a:prstGeom prst="rect">
+            <a:avLst/>
+          </a:prstGeom>
+          <a:noFill/>
+        </p:spPr>
+        <p:txBody>
+          <a:bodyPr wrap="square">
+            <a:spAutoFit/>
+          </a:bodyPr>
+          <a:lstStyle/>
+          <a:p>
+            <a:r>
+              <a:rPr lang="en-US" sz="1000" dirty="0">
+                <a:solidFill>
+                  <a:srgbClr val="000000"/>
+                </a:solidFill>
+                <a:latin typeface="Cascadia Mono" panose="020B0609020000020004" pitchFamily="49" charset="0"/>
+              </a:rPr>
+              <a:t> </a:t>
+            </a:r>
+            <a:r>
+              <a:rPr lang="en-US" sz="1000" dirty="0">
+                <a:solidFill>
+                  <a:srgbClr val="0000FF"/>
+                </a:solidFill>
+                <a:latin typeface="Cascadia Mono" panose="020B0609020000020004" pitchFamily="49" charset="0"/>
+              </a:rPr>
+              <a:t>bool</a:t>
+            </a:r>
+            <a:r>
+              <a:rPr lang="en-US" sz="1000" dirty="0">
+                <a:solidFill>
+                  <a:srgbClr val="000000"/>
+                </a:solidFill>
+                <a:latin typeface="Cascadia Mono" panose="020B0609020000020004" pitchFamily="49" charset="0"/>
+              </a:rPr>
+              <a:t> </a:t>
+            </a:r>
+            <a:r>
+              <a:rPr lang="en-US" sz="1000" dirty="0" err="1">
+                <a:solidFill>
+                  <a:srgbClr val="000000"/>
+                </a:solidFill>
+                <a:latin typeface="Cascadia Mono" panose="020B0609020000020004" pitchFamily="49" charset="0"/>
+              </a:rPr>
+              <a:t>write_then_read</a:t>
+            </a:r>
+            <a:r>
+              <a:rPr lang="en-US" sz="1000" dirty="0">
+                <a:solidFill>
+                  <a:srgbClr val="000000"/>
+                </a:solidFill>
+                <a:latin typeface="Cascadia Mono" panose="020B0609020000020004" pitchFamily="49" charset="0"/>
+              </a:rPr>
+              <a:t>(uint8_t *</a:t>
+            </a:r>
+            <a:r>
+              <a:rPr lang="en-US" sz="1000" dirty="0" err="1">
+                <a:solidFill>
+                  <a:srgbClr val="808080"/>
+                </a:solidFill>
+                <a:latin typeface="Cascadia Mono" panose="020B0609020000020004" pitchFamily="49" charset="0"/>
+              </a:rPr>
+              <a:t>write_buffer</a:t>
+            </a:r>
+            <a:r>
+              <a:rPr lang="en-US" sz="1000" dirty="0">
+                <a:solidFill>
+                  <a:srgbClr val="000000"/>
+                </a:solidFill>
+                <a:latin typeface="Cascadia Mono" panose="020B0609020000020004" pitchFamily="49" charset="0"/>
+              </a:rPr>
+              <a:t>, </a:t>
+            </a:r>
+            <a:r>
+              <a:rPr lang="en-US" sz="1000" dirty="0" err="1">
+                <a:solidFill>
+                  <a:srgbClr val="2B91AF"/>
+                </a:solidFill>
+                <a:latin typeface="Cascadia Mono" panose="020B0609020000020004" pitchFamily="49" charset="0"/>
+              </a:rPr>
+              <a:t>size_t</a:t>
+            </a:r>
+            <a:r>
+              <a:rPr lang="en-US" sz="1000" dirty="0">
+                <a:solidFill>
+                  <a:srgbClr val="000000"/>
+                </a:solidFill>
+                <a:latin typeface="Cascadia Mono" panose="020B0609020000020004" pitchFamily="49" charset="0"/>
+              </a:rPr>
+              <a:t> </a:t>
+            </a:r>
+            <a:r>
+              <a:rPr lang="en-US" sz="1000" dirty="0" err="1">
+                <a:solidFill>
+                  <a:srgbClr val="808080"/>
+                </a:solidFill>
+                <a:latin typeface="Cascadia Mono" panose="020B0609020000020004" pitchFamily="49" charset="0"/>
+              </a:rPr>
+              <a:t>write_len</a:t>
+            </a:r>
+            <a:r>
+              <a:rPr lang="en-US" sz="1000" dirty="0">
+                <a:solidFill>
+                  <a:srgbClr val="000000"/>
+                </a:solidFill>
+                <a:latin typeface="Cascadia Mono" panose="020B0609020000020004" pitchFamily="49" charset="0"/>
+              </a:rPr>
+              <a:t>,</a:t>
+            </a:r>
+          </a:p>
+          <a:p>
+            <a:r>
+              <a:rPr lang="en-US" sz="1000" dirty="0">
+                <a:solidFill>
+                  <a:srgbClr val="000000"/>
+                </a:solidFill>
+                <a:latin typeface="Cascadia Mono" panose="020B0609020000020004" pitchFamily="49" charset="0"/>
+              </a:rPr>
+              <a:t>                       uint8_t *</a:t>
+            </a:r>
+            <a:r>
+              <a:rPr lang="en-US" sz="1000" dirty="0" err="1">
+                <a:solidFill>
+                  <a:srgbClr val="808080"/>
+                </a:solidFill>
+                <a:latin typeface="Cascadia Mono" panose="020B0609020000020004" pitchFamily="49" charset="0"/>
+              </a:rPr>
+              <a:t>read_buffer</a:t>
+            </a:r>
+            <a:r>
+              <a:rPr lang="en-US" sz="1000" dirty="0">
+                <a:solidFill>
+                  <a:srgbClr val="000000"/>
+                </a:solidFill>
+                <a:latin typeface="Cascadia Mono" panose="020B0609020000020004" pitchFamily="49" charset="0"/>
+              </a:rPr>
+              <a:t>, </a:t>
+            </a:r>
+            <a:r>
+              <a:rPr lang="en-US" sz="1000" dirty="0" err="1">
+                <a:solidFill>
+                  <a:srgbClr val="2B91AF"/>
+                </a:solidFill>
+                <a:latin typeface="Cascadia Mono" panose="020B0609020000020004" pitchFamily="49" charset="0"/>
+              </a:rPr>
+              <a:t>size_t</a:t>
+            </a:r>
+            <a:r>
+              <a:rPr lang="en-US" sz="1000" dirty="0">
+                <a:solidFill>
+                  <a:srgbClr val="000000"/>
+                </a:solidFill>
+                <a:latin typeface="Cascadia Mono" panose="020B0609020000020004" pitchFamily="49" charset="0"/>
+              </a:rPr>
+              <a:t> </a:t>
+            </a:r>
+            <a:r>
+              <a:rPr lang="en-US" sz="1000" dirty="0" err="1">
+                <a:solidFill>
+                  <a:srgbClr val="808080"/>
+                </a:solidFill>
+                <a:latin typeface="Cascadia Mono" panose="020B0609020000020004" pitchFamily="49" charset="0"/>
+              </a:rPr>
+              <a:t>read_len</a:t>
+            </a:r>
+            <a:r>
+              <a:rPr lang="en-US" sz="1000" dirty="0">
+                <a:solidFill>
+                  <a:srgbClr val="000000"/>
+                </a:solidFill>
+                <a:latin typeface="Cascadia Mono" panose="020B0609020000020004" pitchFamily="49" charset="0"/>
+              </a:rPr>
+              <a:t>,</a:t>
+            </a:r>
+          </a:p>
+          <a:p>
+            <a:r>
+              <a:rPr lang="en-US" sz="1000" dirty="0">
+                <a:solidFill>
+                  <a:srgbClr val="000000"/>
+                </a:solidFill>
+                <a:latin typeface="Cascadia Mono" panose="020B0609020000020004" pitchFamily="49" charset="0"/>
+              </a:rPr>
+              <a:t>                       uint8_t </a:t>
+            </a:r>
+            <a:r>
+              <a:rPr lang="en-US" sz="1000" dirty="0" err="1">
+                <a:solidFill>
+                  <a:srgbClr val="808080"/>
+                </a:solidFill>
+                <a:latin typeface="Cascadia Mono" panose="020B0609020000020004" pitchFamily="49" charset="0"/>
+              </a:rPr>
+              <a:t>sendvalue</a:t>
+            </a:r>
+            <a:r>
+              <a:rPr lang="en-US" sz="1000" dirty="0">
+                <a:solidFill>
+                  <a:srgbClr val="000000"/>
+                </a:solidFill>
+                <a:latin typeface="Cascadia Mono" panose="020B0609020000020004" pitchFamily="49" charset="0"/>
+              </a:rPr>
+              <a:t> = 0xFF);</a:t>
+            </a:r>
+            <a:endParaRPr lang="en-US" sz="1000" dirty="0"/>
+          </a:p>
+        </p:txBody>
+      </p:sp>
+      <p:sp>
+        <p:nvSpPr>
+          <p:cNvPr id="24" name="TextBox 23">
+            <a:extLst>
+              <a:ext uri="{FF2B5EF4-FFF2-40B4-BE49-F238E27FC236}">
+                <a16:creationId xmlns:a16="http://schemas.microsoft.com/office/drawing/2014/main" id="{FA238329-87C5-0F33-FE88-F436C6FFB611}"/>
+              </a:ext>
+            </a:extLst>
+          </p:cNvPr>
+          <p:cNvSpPr txBox="1"/>
+          <p:nvPr/>
+        </p:nvSpPr>
+        <p:spPr>
+          <a:xfrm>
+            <a:off x="12547600" y="6795282"/>
+            <a:ext cx="5812810" cy="369332"/>
+          </a:xfrm>
+          <a:prstGeom prst="rect">
+            <a:avLst/>
+          </a:prstGeom>
+          <a:noFill/>
+        </p:spPr>
+        <p:txBody>
+          <a:bodyPr wrap="none" rtlCol="0">
+            <a:spAutoFit/>
+          </a:bodyPr>
+          <a:lstStyle/>
+          <a:p>
+            <a:r>
+              <a:rPr lang="en-US" dirty="0"/>
+              <a:t>Function prototype defines default value for 5</a:t>
+            </a:r>
+            <a:r>
+              <a:rPr lang="en-US" baseline="30000" dirty="0"/>
+              <a:t>th</a:t>
+            </a:r>
+            <a:r>
+              <a:rPr lang="en-US" dirty="0"/>
+              <a:t> argument</a:t>
+            </a:r>
+          </a:p>
+        </p:txBody>
+      </p:sp>
+      <p:sp>
+        <p:nvSpPr>
+          <p:cNvPr id="25" name="Rectangle: Rounded Corners 24">
+            <a:extLst>
+              <a:ext uri="{FF2B5EF4-FFF2-40B4-BE49-F238E27FC236}">
+                <a16:creationId xmlns:a16="http://schemas.microsoft.com/office/drawing/2014/main" id="{2BBA74E4-3265-C9F0-75EC-B03534389EF5}"/>
+              </a:ext>
+            </a:extLst>
+          </p:cNvPr>
+          <p:cNvSpPr/>
+          <p:nvPr/>
+        </p:nvSpPr>
+        <p:spPr>
+          <a:xfrm>
+            <a:off x="12670972" y="7200900"/>
+            <a:ext cx="4775200" cy="553998"/>
+          </a:xfrm>
+          <a:prstGeom prst="roundRect">
+            <a:avLst/>
+          </a:prstGeom>
+          <a:noFill/>
+          <a:ln>
+            <a:solidFill>
+              <a:srgbClr val="FF0000"/>
+            </a:solidFill>
+          </a:ln>
+        </p:spPr>
+        <p:style>
+          <a:lnRef idx="2">
+            <a:schemeClr val="accent1">
+              <a:shade val="15000"/>
+            </a:schemeClr>
+          </a:lnRef>
+          <a:fillRef idx="1">
+            <a:schemeClr val="accent1"/>
+          </a:fillRef>
+          <a:effectRef idx="0">
+            <a:schemeClr val="accent1"/>
+          </a:effectRef>
+          <a:fontRef idx="minor">
+            <a:schemeClr val="lt1"/>
+          </a:fontRef>
+        </p:style>
+        <p:txBody>
+          <a:bodyPr rtlCol="0" anchor="ctr"/>
+          <a:lstStyle/>
+          <a:p>
+            <a:pPr algn="ctr"/>
+            <a:endParaRPr lang="en-US"/>
           </a:p>
         </p:txBody>
       </p:sp>
@@ -14816,6 +17517,137 @@
 </file>
 
 <file path=ppt/slides/slide4.xml><?xml version="1.0" encoding="utf-8"?>
+<p:sld xmlns:a="http://schemas.openxmlformats.org/drawingml/2006/main" xmlns:r="http://schemas.openxmlformats.org/officeDocument/2006/relationships" xmlns:p="http://schemas.openxmlformats.org/presentationml/2006/main">
+  <p:cSld>
+    <p:spTree>
+      <p:nvGrpSpPr>
+        <p:cNvPr id="1" name="">
+          <a:extLst>
+            <a:ext uri="{FF2B5EF4-FFF2-40B4-BE49-F238E27FC236}">
+              <a16:creationId xmlns:a16="http://schemas.microsoft.com/office/drawing/2014/main" id="{E78D1A3A-FB33-98D7-3F6F-10BBE7CB5E49}"/>
+            </a:ext>
+          </a:extLst>
+        </p:cNvPr>
+        <p:cNvGrpSpPr/>
+        <p:nvPr/>
+      </p:nvGrpSpPr>
+      <p:grpSpPr>
+        <a:xfrm>
+          <a:off x="0" y="0"/>
+          <a:ext cx="0" cy="0"/>
+          <a:chOff x="0" y="0"/>
+          <a:chExt cx="0" cy="0"/>
+        </a:xfrm>
+      </p:grpSpPr>
+      <p:sp>
+        <p:nvSpPr>
+          <p:cNvPr id="17" name="TextBox 16">
+            <a:extLst>
+              <a:ext uri="{FF2B5EF4-FFF2-40B4-BE49-F238E27FC236}">
+                <a16:creationId xmlns:a16="http://schemas.microsoft.com/office/drawing/2014/main" id="{397E4F65-AE94-4B4E-C396-57A27054F275}"/>
+              </a:ext>
+            </a:extLst>
+          </p:cNvPr>
+          <p:cNvSpPr txBox="1"/>
+          <p:nvPr/>
+        </p:nvSpPr>
+        <p:spPr>
+          <a:xfrm>
+            <a:off x="143435" y="71718"/>
+            <a:ext cx="3574505" cy="369332"/>
+          </a:xfrm>
+          <a:prstGeom prst="rect">
+            <a:avLst/>
+          </a:prstGeom>
+          <a:noFill/>
+        </p:spPr>
+        <p:txBody>
+          <a:bodyPr wrap="none" rtlCol="0">
+            <a:spAutoFit/>
+          </a:bodyPr>
+          <a:lstStyle/>
+          <a:p>
+            <a:r>
+              <a:rPr lang="en-US" b="1" dirty="0"/>
+              <a:t>Read Cold Junction Temperature</a:t>
+            </a:r>
+          </a:p>
+        </p:txBody>
+      </p:sp>
+      <p:pic>
+        <p:nvPicPr>
+          <p:cNvPr id="8" name="Picture 7">
+            <a:extLst>
+              <a:ext uri="{FF2B5EF4-FFF2-40B4-BE49-F238E27FC236}">
+                <a16:creationId xmlns:a16="http://schemas.microsoft.com/office/drawing/2014/main" id="{4B7FA424-A652-EEFC-8313-C5C12C0678CC}"/>
+              </a:ext>
+            </a:extLst>
+          </p:cNvPr>
+          <p:cNvPicPr>
+            <a:picLocks noChangeAspect="1"/>
+          </p:cNvPicPr>
+          <p:nvPr/>
+        </p:nvPicPr>
+        <p:blipFill>
+          <a:blip r:embed="rId2"/>
+          <a:stretch>
+            <a:fillRect/>
+          </a:stretch>
+        </p:blipFill>
+        <p:spPr>
+          <a:xfrm>
+            <a:off x="625580" y="623841"/>
+            <a:ext cx="1305107" cy="657317"/>
+          </a:xfrm>
+          <a:prstGeom prst="rect">
+            <a:avLst/>
+          </a:prstGeom>
+        </p:spPr>
+      </p:pic>
+      <p:pic>
+        <p:nvPicPr>
+          <p:cNvPr id="22" name="Picture 21">
+            <a:extLst>
+              <a:ext uri="{FF2B5EF4-FFF2-40B4-BE49-F238E27FC236}">
+                <a16:creationId xmlns:a16="http://schemas.microsoft.com/office/drawing/2014/main" id="{37B0EBB9-F978-C9A5-9F2A-440E3DD54C6E}"/>
+              </a:ext>
+            </a:extLst>
+          </p:cNvPr>
+          <p:cNvPicPr>
+            <a:picLocks noChangeAspect="1"/>
+          </p:cNvPicPr>
+          <p:nvPr/>
+        </p:nvPicPr>
+        <p:blipFill>
+          <a:blip r:embed="rId3"/>
+          <a:stretch>
+            <a:fillRect/>
+          </a:stretch>
+        </p:blipFill>
+        <p:spPr>
+          <a:xfrm>
+            <a:off x="625580" y="2890814"/>
+            <a:ext cx="1752845" cy="333422"/>
+          </a:xfrm>
+          <a:prstGeom prst="rect">
+            <a:avLst/>
+          </a:prstGeom>
+        </p:spPr>
+      </p:pic>
+    </p:spTree>
+    <p:extLst>
+      <p:ext uri="{BB962C8B-B14F-4D97-AF65-F5344CB8AC3E}">
+        <p14:creationId xmlns:p14="http://schemas.microsoft.com/office/powerpoint/2010/main" val="3304415855"/>
+      </p:ext>
+    </p:extLst>
+  </p:cSld>
+  <p:clrMapOvr>
+    <a:masterClrMapping/>
+  </p:clrMapOvr>
+</p:sld>
+</file>
+
+<file path=ppt/slides/slide5.xml><?xml version="1.0" encoding="utf-8"?>
 <p:sld xmlns:a="http://schemas.openxmlformats.org/drawingml/2006/main" xmlns:r="http://schemas.openxmlformats.org/officeDocument/2006/relationships" xmlns:p="http://schemas.openxmlformats.org/presentationml/2006/main">
   <p:cSld>
     <p:spTree>

</xml_diff>